<commit_message>
added some Presentation logic
</commit_message>
<xml_diff>
--- a/Templates/Presentation1.pptx
+++ b/Templates/Presentation1.pptx
@@ -2,10 +2,11 @@
 <file path=ppt/presentation.xml><?xml version="1.0" encoding="utf-8"?>
 <p:presentation xmlns:a="http://schemas.openxmlformats.org/drawingml/2006/main" xmlns:r="http://schemas.openxmlformats.org/officeDocument/2006/relationships" xmlns:p="http://schemas.openxmlformats.org/presentationml/2006/main" saveSubsetFonts="1">
   <p:sldMasterIdLst>
-    <p:sldMasterId id="2147483648" r:id="rId1"/>
+    <p:sldMasterId id="2147483684" r:id="rId1"/>
   </p:sldMasterIdLst>
   <p:sldIdLst>
     <p:sldId id="256" r:id="rId2"/>
+    <p:sldId id="257" r:id="rId3"/>
   </p:sldIdLst>
   <p:sldSz cx="12192000" cy="6858000"/>
   <p:notesSz cx="6858000" cy="9144000"/>
@@ -13,7 +14,7 @@
     <a:defPPr>
       <a:defRPr lang="en-US"/>
     </a:defPPr>
-    <a:lvl1pPr marL="0" algn="l" defTabSz="914400" rtl="0" eaLnBrk="1" latinLnBrk="0" hangingPunct="1">
+    <a:lvl1pPr marL="0" algn="l" defTabSz="457200" rtl="0" eaLnBrk="1" latinLnBrk="0" hangingPunct="1">
       <a:defRPr sz="1800" kern="1200">
         <a:solidFill>
           <a:schemeClr val="tx1"/>
@@ -23,7 +24,7 @@
         <a:cs typeface="+mn-cs"/>
       </a:defRPr>
     </a:lvl1pPr>
-    <a:lvl2pPr marL="457200" algn="l" defTabSz="914400" rtl="0" eaLnBrk="1" latinLnBrk="0" hangingPunct="1">
+    <a:lvl2pPr marL="457200" algn="l" defTabSz="457200" rtl="0" eaLnBrk="1" latinLnBrk="0" hangingPunct="1">
       <a:defRPr sz="1800" kern="1200">
         <a:solidFill>
           <a:schemeClr val="tx1"/>
@@ -33,7 +34,7 @@
         <a:cs typeface="+mn-cs"/>
       </a:defRPr>
     </a:lvl2pPr>
-    <a:lvl3pPr marL="914400" algn="l" defTabSz="914400" rtl="0" eaLnBrk="1" latinLnBrk="0" hangingPunct="1">
+    <a:lvl3pPr marL="914400" algn="l" defTabSz="457200" rtl="0" eaLnBrk="1" latinLnBrk="0" hangingPunct="1">
       <a:defRPr sz="1800" kern="1200">
         <a:solidFill>
           <a:schemeClr val="tx1"/>
@@ -43,7 +44,7 @@
         <a:cs typeface="+mn-cs"/>
       </a:defRPr>
     </a:lvl3pPr>
-    <a:lvl4pPr marL="1371600" algn="l" defTabSz="914400" rtl="0" eaLnBrk="1" latinLnBrk="0" hangingPunct="1">
+    <a:lvl4pPr marL="1371600" algn="l" defTabSz="457200" rtl="0" eaLnBrk="1" latinLnBrk="0" hangingPunct="1">
       <a:defRPr sz="1800" kern="1200">
         <a:solidFill>
           <a:schemeClr val="tx1"/>
@@ -53,7 +54,7 @@
         <a:cs typeface="+mn-cs"/>
       </a:defRPr>
     </a:lvl4pPr>
-    <a:lvl5pPr marL="1828800" algn="l" defTabSz="914400" rtl="0" eaLnBrk="1" latinLnBrk="0" hangingPunct="1">
+    <a:lvl5pPr marL="1828800" algn="l" defTabSz="457200" rtl="0" eaLnBrk="1" latinLnBrk="0" hangingPunct="1">
       <a:defRPr sz="1800" kern="1200">
         <a:solidFill>
           <a:schemeClr val="tx1"/>
@@ -63,7 +64,7 @@
         <a:cs typeface="+mn-cs"/>
       </a:defRPr>
     </a:lvl5pPr>
-    <a:lvl6pPr marL="2286000" algn="l" defTabSz="914400" rtl="0" eaLnBrk="1" latinLnBrk="0" hangingPunct="1">
+    <a:lvl6pPr marL="2286000" algn="l" defTabSz="457200" rtl="0" eaLnBrk="1" latinLnBrk="0" hangingPunct="1">
       <a:defRPr sz="1800" kern="1200">
         <a:solidFill>
           <a:schemeClr val="tx1"/>
@@ -73,7 +74,7 @@
         <a:cs typeface="+mn-cs"/>
       </a:defRPr>
     </a:lvl6pPr>
-    <a:lvl7pPr marL="2743200" algn="l" defTabSz="914400" rtl="0" eaLnBrk="1" latinLnBrk="0" hangingPunct="1">
+    <a:lvl7pPr marL="2743200" algn="l" defTabSz="457200" rtl="0" eaLnBrk="1" latinLnBrk="0" hangingPunct="1">
       <a:defRPr sz="1800" kern="1200">
         <a:solidFill>
           <a:schemeClr val="tx1"/>
@@ -83,7 +84,7 @@
         <a:cs typeface="+mn-cs"/>
       </a:defRPr>
     </a:lvl7pPr>
-    <a:lvl8pPr marL="3200400" algn="l" defTabSz="914400" rtl="0" eaLnBrk="1" latinLnBrk="0" hangingPunct="1">
+    <a:lvl8pPr marL="3200400" algn="l" defTabSz="457200" rtl="0" eaLnBrk="1" latinLnBrk="0" hangingPunct="1">
       <a:defRPr sz="1800" kern="1200">
         <a:solidFill>
           <a:schemeClr val="tx1"/>
@@ -93,7 +94,7 @@
         <a:cs typeface="+mn-cs"/>
       </a:defRPr>
     </a:lvl8pPr>
-    <a:lvl9pPr marL="3657600" algn="l" defTabSz="914400" rtl="0" eaLnBrk="1" latinLnBrk="0" hangingPunct="1">
+    <a:lvl9pPr marL="3657600" algn="l" defTabSz="457200" rtl="0" eaLnBrk="1" latinLnBrk="0" hangingPunct="1">
       <a:defRPr sz="1800" kern="1200">
         <a:solidFill>
           <a:schemeClr val="tx1"/>
@@ -117,7 +118,7 @@
 </file>
 
 <file path=ppt/slideLayouts/slideLayout1.xml><?xml version="1.0" encoding="utf-8"?>
-<p:sldLayout xmlns:a="http://schemas.openxmlformats.org/drawingml/2006/main" xmlns:r="http://schemas.openxmlformats.org/officeDocument/2006/relationships" xmlns:p="http://schemas.openxmlformats.org/presentationml/2006/main" type="title" preserve="1">
+<p:sldLayout xmlns:a="http://schemas.openxmlformats.org/drawingml/2006/main" xmlns:r="http://schemas.openxmlformats.org/officeDocument/2006/relationships" xmlns:p="http://schemas.openxmlformats.org/presentationml/2006/main" showMasterSp="0" type="title" preserve="1">
   <p:cSld name="Title Slide">
     <p:spTree>
       <p:nvGrpSpPr>
@@ -135,13 +136,83 @@
       </p:grpSpPr>
       <p:sp>
         <p:nvSpPr>
-          <p:cNvPr id="2" name="Title 1">
-            <a:extLst>
-              <a:ext uri="{FF2B5EF4-FFF2-40B4-BE49-F238E27FC236}">
-                <a16:creationId xmlns:a16="http://schemas.microsoft.com/office/drawing/2014/main" id="{1E8FDFD2-A764-4A95-A2F6-EAC9D7043412}"/>
-              </a:ext>
-            </a:extLst>
-          </p:cNvPr>
+          <p:cNvPr id="7" name="Rectangle 6"/>
+          <p:cNvSpPr/>
+          <p:nvPr/>
+        </p:nvSpPr>
+        <p:spPr>
+          <a:xfrm>
+            <a:off x="3175" y="6400800"/>
+            <a:ext cx="12188825" cy="457200"/>
+          </a:xfrm>
+          <a:prstGeom prst="rect">
+            <a:avLst/>
+          </a:prstGeom>
+          <a:solidFill>
+            <a:schemeClr val="accent2"/>
+          </a:solidFill>
+          <a:ln>
+            <a:noFill/>
+          </a:ln>
+        </p:spPr>
+        <p:style>
+          <a:lnRef idx="2">
+            <a:schemeClr val="accent1">
+              <a:shade val="50000"/>
+            </a:schemeClr>
+          </a:lnRef>
+          <a:fillRef idx="1">
+            <a:schemeClr val="accent1"/>
+          </a:fillRef>
+          <a:effectRef idx="0">
+            <a:schemeClr val="accent1"/>
+          </a:effectRef>
+          <a:fontRef idx="minor">
+            <a:schemeClr val="lt1"/>
+          </a:fontRef>
+        </p:style>
+      </p:sp>
+      <p:sp>
+        <p:nvSpPr>
+          <p:cNvPr id="8" name="Rectangle 7"/>
+          <p:cNvSpPr/>
+          <p:nvPr/>
+        </p:nvSpPr>
+        <p:spPr>
+          <a:xfrm>
+            <a:off x="15" y="6334316"/>
+            <a:ext cx="12188825" cy="64008"/>
+          </a:xfrm>
+          <a:prstGeom prst="rect">
+            <a:avLst/>
+          </a:prstGeom>
+          <a:solidFill>
+            <a:schemeClr val="accent1"/>
+          </a:solidFill>
+          <a:ln>
+            <a:noFill/>
+          </a:ln>
+        </p:spPr>
+        <p:style>
+          <a:lnRef idx="2">
+            <a:schemeClr val="accent1">
+              <a:shade val="50000"/>
+            </a:schemeClr>
+          </a:lnRef>
+          <a:fillRef idx="1">
+            <a:schemeClr val="accent1"/>
+          </a:fillRef>
+          <a:effectRef idx="0">
+            <a:schemeClr val="accent1"/>
+          </a:effectRef>
+          <a:fontRef idx="minor">
+            <a:schemeClr val="lt1"/>
+          </a:fontRef>
+        </p:style>
+      </p:sp>
+      <p:sp>
+        <p:nvSpPr>
+          <p:cNvPr id="2" name="Title 1"/>
           <p:cNvSpPr>
             <a:spLocks noGrp="1"/>
           </p:cNvSpPr>
@@ -151,15 +222,27 @@
         </p:nvSpPr>
         <p:spPr>
           <a:xfrm>
-            <a:off x="1524000" y="1122363"/>
-            <a:ext cx="9144000" cy="2387600"/>
-          </a:xfrm>
-        </p:spPr>
-        <p:txBody>
-          <a:bodyPr anchor="b"/>
+            <a:off x="1097280" y="758952"/>
+            <a:ext cx="10058400" cy="3566160"/>
+          </a:xfrm>
+        </p:spPr>
+        <p:txBody>
+          <a:bodyPr anchor="b">
+            <a:normAutofit/>
+          </a:bodyPr>
           <a:lstStyle>
-            <a:lvl1pPr algn="ctr">
-              <a:defRPr sz="6000"/>
+            <a:lvl1pPr algn="l">
+              <a:lnSpc>
+                <a:spcPct val="85000"/>
+              </a:lnSpc>
+              <a:defRPr sz="8000" spc="-50" baseline="0">
+                <a:solidFill>
+                  <a:schemeClr val="tx1">
+                    <a:lumMod val="85000"/>
+                    <a:lumOff val="15000"/>
+                  </a:schemeClr>
+                </a:solidFill>
+              </a:defRPr>
             </a:lvl1pPr>
           </a:lstStyle>
           <a:p>
@@ -167,18 +250,13 @@
               <a:rPr lang="en-US"/>
               <a:t>Click to edit Master title style</a:t>
             </a:r>
-          </a:p>
-        </p:txBody>
-      </p:sp>
-      <p:sp>
-        <p:nvSpPr>
-          <p:cNvPr id="3" name="Subtitle 2">
-            <a:extLst>
-              <a:ext uri="{FF2B5EF4-FFF2-40B4-BE49-F238E27FC236}">
-                <a16:creationId xmlns:a16="http://schemas.microsoft.com/office/drawing/2014/main" id="{D6F94918-6CCE-4FE2-A66C-053C63050E62}"/>
-              </a:ext>
-            </a:extLst>
-          </p:cNvPr>
+            <a:endParaRPr lang="en-US" dirty="0"/>
+          </a:p>
+        </p:txBody>
+      </p:sp>
+      <p:sp>
+        <p:nvSpPr>
+          <p:cNvPr id="3" name="Subtitle 2"/>
           <p:cNvSpPr>
             <a:spLocks noGrp="1"/>
           </p:cNvSpPr>
@@ -188,48 +266,55 @@
         </p:nvSpPr>
         <p:spPr>
           <a:xfrm>
-            <a:off x="1524000" y="3602038"/>
-            <a:ext cx="9144000" cy="1655762"/>
-          </a:xfrm>
-        </p:spPr>
-        <p:txBody>
-          <a:bodyPr/>
+            <a:off x="1100051" y="4455620"/>
+            <a:ext cx="10058400" cy="1143000"/>
+          </a:xfrm>
+        </p:spPr>
+        <p:txBody>
+          <a:bodyPr lIns="91440" rIns="91440">
+            <a:normAutofit/>
+          </a:bodyPr>
           <a:lstStyle>
-            <a:lvl1pPr marL="0" indent="0" algn="ctr">
-              <a:buNone/>
-              <a:defRPr sz="2400"/>
+            <a:lvl1pPr marL="0" indent="0" algn="l">
+              <a:buNone/>
+              <a:defRPr sz="2400" cap="all" spc="200" baseline="0">
+                <a:solidFill>
+                  <a:schemeClr val="tx2"/>
+                </a:solidFill>
+                <a:latin typeface="+mj-lt"/>
+              </a:defRPr>
             </a:lvl1pPr>
             <a:lvl2pPr marL="457200" indent="0" algn="ctr">
               <a:buNone/>
-              <a:defRPr sz="2000"/>
+              <a:defRPr sz="2400"/>
             </a:lvl2pPr>
             <a:lvl3pPr marL="914400" indent="0" algn="ctr">
               <a:buNone/>
-              <a:defRPr sz="1800"/>
+              <a:defRPr sz="2400"/>
             </a:lvl3pPr>
             <a:lvl4pPr marL="1371600" indent="0" algn="ctr">
               <a:buNone/>
-              <a:defRPr sz="1600"/>
+              <a:defRPr sz="2000"/>
             </a:lvl4pPr>
             <a:lvl5pPr marL="1828800" indent="0" algn="ctr">
               <a:buNone/>
-              <a:defRPr sz="1600"/>
+              <a:defRPr sz="2000"/>
             </a:lvl5pPr>
             <a:lvl6pPr marL="2286000" indent="0" algn="ctr">
               <a:buNone/>
-              <a:defRPr sz="1600"/>
+              <a:defRPr sz="2000"/>
             </a:lvl6pPr>
             <a:lvl7pPr marL="2743200" indent="0" algn="ctr">
               <a:buNone/>
-              <a:defRPr sz="1600"/>
+              <a:defRPr sz="2000"/>
             </a:lvl7pPr>
             <a:lvl8pPr marL="3200400" indent="0" algn="ctr">
               <a:buNone/>
-              <a:defRPr sz="1600"/>
+              <a:defRPr sz="2000"/>
             </a:lvl8pPr>
             <a:lvl9pPr marL="3657600" indent="0" algn="ctr">
               <a:buNone/>
-              <a:defRPr sz="1600"/>
+              <a:defRPr sz="2000"/>
             </a:lvl9pPr>
           </a:lstStyle>
           <a:p>
@@ -237,18 +322,13 @@
               <a:rPr lang="en-US"/>
               <a:t>Click to edit Master subtitle style</a:t>
             </a:r>
-          </a:p>
-        </p:txBody>
-      </p:sp>
-      <p:sp>
-        <p:nvSpPr>
-          <p:cNvPr id="4" name="Date Placeholder 3">
-            <a:extLst>
-              <a:ext uri="{FF2B5EF4-FFF2-40B4-BE49-F238E27FC236}">
-                <a16:creationId xmlns:a16="http://schemas.microsoft.com/office/drawing/2014/main" id="{BF1BBB0A-6096-4D24-8435-B489F7EC2BC2}"/>
-              </a:ext>
-            </a:extLst>
-          </p:cNvPr>
+            <a:endParaRPr lang="en-US" dirty="0"/>
+          </a:p>
+        </p:txBody>
+      </p:sp>
+      <p:sp>
+        <p:nvSpPr>
+          <p:cNvPr id="4" name="Date Placeholder 3"/>
           <p:cNvSpPr>
             <a:spLocks noGrp="1"/>
           </p:cNvSpPr>
@@ -263,7 +343,7 @@
           <a:p>
             <a:fld id="{33EF576E-7D2A-427A-9890-14E4055C307B}" type="datetimeFigureOut">
               <a:rPr lang="en-US" smtClean="0"/>
-              <a:t>11/1/2017</a:t>
+              <a:t>11/28/2017</a:t>
             </a:fld>
             <a:endParaRPr lang="en-US"/>
           </a:p>
@@ -271,13 +351,7 @@
       </p:sp>
       <p:sp>
         <p:nvSpPr>
-          <p:cNvPr id="5" name="Footer Placeholder 4">
-            <a:extLst>
-              <a:ext uri="{FF2B5EF4-FFF2-40B4-BE49-F238E27FC236}">
-                <a16:creationId xmlns:a16="http://schemas.microsoft.com/office/drawing/2014/main" id="{6AAB9B6A-F036-4B5C-8731-77F1C277310B}"/>
-              </a:ext>
-            </a:extLst>
-          </p:cNvPr>
+          <p:cNvPr id="5" name="Footer Placeholder 4"/>
           <p:cNvSpPr>
             <a:spLocks noGrp="1"/>
           </p:cNvSpPr>
@@ -296,13 +370,7 @@
       </p:sp>
       <p:sp>
         <p:nvSpPr>
-          <p:cNvPr id="6" name="Slide Number Placeholder 5">
-            <a:extLst>
-              <a:ext uri="{FF2B5EF4-FFF2-40B4-BE49-F238E27FC236}">
-                <a16:creationId xmlns:a16="http://schemas.microsoft.com/office/drawing/2014/main" id="{CABF45A8-397D-4A48-913D-7E5127BC87F5}"/>
-              </a:ext>
-            </a:extLst>
-          </p:cNvPr>
+          <p:cNvPr id="6" name="Slide Number Placeholder 5"/>
           <p:cNvSpPr>
             <a:spLocks noGrp="1"/>
           </p:cNvSpPr>
@@ -323,10 +391,48 @@
           </a:p>
         </p:txBody>
       </p:sp>
+      <p:cxnSp>
+        <p:nvCxnSpPr>
+          <p:cNvPr id="9" name="Straight Connector 8"/>
+          <p:cNvCxnSpPr/>
+          <p:nvPr/>
+        </p:nvCxnSpPr>
+        <p:spPr>
+          <a:xfrm>
+            <a:off x="1207658" y="4343400"/>
+            <a:ext cx="9875520" cy="0"/>
+          </a:xfrm>
+          <a:prstGeom prst="line">
+            <a:avLst/>
+          </a:prstGeom>
+          <a:ln w="6350">
+            <a:solidFill>
+              <a:schemeClr val="tx1">
+                <a:lumMod val="50000"/>
+                <a:lumOff val="50000"/>
+              </a:schemeClr>
+            </a:solidFill>
+          </a:ln>
+        </p:spPr>
+        <p:style>
+          <a:lnRef idx="1">
+            <a:schemeClr val="accent1"/>
+          </a:lnRef>
+          <a:fillRef idx="0">
+            <a:schemeClr val="accent1"/>
+          </a:fillRef>
+          <a:effectRef idx="0">
+            <a:schemeClr val="accent1"/>
+          </a:effectRef>
+          <a:fontRef idx="minor">
+            <a:schemeClr val="tx1"/>
+          </a:fontRef>
+        </p:style>
+      </p:cxnSp>
     </p:spTree>
     <p:extLst>
       <p:ext uri="{BB962C8B-B14F-4D97-AF65-F5344CB8AC3E}">
-        <p14:creationId xmlns:p14="http://schemas.microsoft.com/office/powerpoint/2010/main" val="3630227210"/>
+        <p14:creationId xmlns:p14="http://schemas.microsoft.com/office/powerpoint/2010/main" val="2188696393"/>
       </p:ext>
     </p:extLst>
   </p:cSld>
@@ -355,13 +461,7 @@
       </p:grpSpPr>
       <p:sp>
         <p:nvSpPr>
-          <p:cNvPr id="2" name="Title 1">
-            <a:extLst>
-              <a:ext uri="{FF2B5EF4-FFF2-40B4-BE49-F238E27FC236}">
-                <a16:creationId xmlns:a16="http://schemas.microsoft.com/office/drawing/2014/main" id="{483AADEA-DD8C-429F-AF96-3F1F5DDE7453}"/>
-              </a:ext>
-            </a:extLst>
-          </p:cNvPr>
+          <p:cNvPr id="2" name="Title 1"/>
           <p:cNvSpPr>
             <a:spLocks noGrp="1"/>
           </p:cNvSpPr>
@@ -378,18 +478,13 @@
               <a:rPr lang="en-US"/>
               <a:t>Click to edit Master title style</a:t>
             </a:r>
-          </a:p>
-        </p:txBody>
-      </p:sp>
-      <p:sp>
-        <p:nvSpPr>
-          <p:cNvPr id="3" name="Vertical Text Placeholder 2">
-            <a:extLst>
-              <a:ext uri="{FF2B5EF4-FFF2-40B4-BE49-F238E27FC236}">
-                <a16:creationId xmlns:a16="http://schemas.microsoft.com/office/drawing/2014/main" id="{FB98537C-2212-465B-9A92-31DC4C635865}"/>
-              </a:ext>
-            </a:extLst>
-          </p:cNvPr>
+            <a:endParaRPr lang="en-US" dirty="0"/>
+          </a:p>
+        </p:txBody>
+      </p:sp>
+      <p:sp>
+        <p:nvSpPr>
+          <p:cNvPr id="3" name="Vertical Text Placeholder 2"/>
           <p:cNvSpPr>
             <a:spLocks noGrp="1"/>
           </p:cNvSpPr>
@@ -399,7 +494,7 @@
         </p:nvSpPr>
         <p:spPr/>
         <p:txBody>
-          <a:bodyPr vert="eaVert"/>
+          <a:bodyPr vert="eaVert" lIns="45720" tIns="0" rIns="45720" bIns="0"/>
           <a:lstStyle/>
           <a:p>
             <a:pPr lvl="0"/>
@@ -435,18 +530,13 @@
               <a:rPr lang="en-US"/>
               <a:t>Fifth level</a:t>
             </a:r>
-          </a:p>
-        </p:txBody>
-      </p:sp>
-      <p:sp>
-        <p:nvSpPr>
-          <p:cNvPr id="4" name="Date Placeholder 3">
-            <a:extLst>
-              <a:ext uri="{FF2B5EF4-FFF2-40B4-BE49-F238E27FC236}">
-                <a16:creationId xmlns:a16="http://schemas.microsoft.com/office/drawing/2014/main" id="{869DE5C0-4D2D-444D-A0F2-35FB7DF78925}"/>
-              </a:ext>
-            </a:extLst>
-          </p:cNvPr>
+            <a:endParaRPr lang="en-US" dirty="0"/>
+          </a:p>
+        </p:txBody>
+      </p:sp>
+      <p:sp>
+        <p:nvSpPr>
+          <p:cNvPr id="4" name="Date Placeholder 3"/>
           <p:cNvSpPr>
             <a:spLocks noGrp="1"/>
           </p:cNvSpPr>
@@ -461,7 +551,7 @@
           <a:p>
             <a:fld id="{33EF576E-7D2A-427A-9890-14E4055C307B}" type="datetimeFigureOut">
               <a:rPr lang="en-US" smtClean="0"/>
-              <a:t>11/1/2017</a:t>
+              <a:t>11/28/2017</a:t>
             </a:fld>
             <a:endParaRPr lang="en-US"/>
           </a:p>
@@ -469,13 +559,7 @@
       </p:sp>
       <p:sp>
         <p:nvSpPr>
-          <p:cNvPr id="5" name="Footer Placeholder 4">
-            <a:extLst>
-              <a:ext uri="{FF2B5EF4-FFF2-40B4-BE49-F238E27FC236}">
-                <a16:creationId xmlns:a16="http://schemas.microsoft.com/office/drawing/2014/main" id="{4B594876-16EA-4B95-AF30-3AEFAF9C36E3}"/>
-              </a:ext>
-            </a:extLst>
-          </p:cNvPr>
+          <p:cNvPr id="5" name="Footer Placeholder 4"/>
           <p:cNvSpPr>
             <a:spLocks noGrp="1"/>
           </p:cNvSpPr>
@@ -494,13 +578,7 @@
       </p:sp>
       <p:sp>
         <p:nvSpPr>
-          <p:cNvPr id="6" name="Slide Number Placeholder 5">
-            <a:extLst>
-              <a:ext uri="{FF2B5EF4-FFF2-40B4-BE49-F238E27FC236}">
-                <a16:creationId xmlns:a16="http://schemas.microsoft.com/office/drawing/2014/main" id="{96F1EF97-C418-4466-8733-C0A2208054D1}"/>
-              </a:ext>
-            </a:extLst>
-          </p:cNvPr>
+          <p:cNvPr id="6" name="Slide Number Placeholder 5"/>
           <p:cNvSpPr>
             <a:spLocks noGrp="1"/>
           </p:cNvSpPr>
@@ -524,7 +602,7 @@
     </p:spTree>
     <p:extLst>
       <p:ext uri="{BB962C8B-B14F-4D97-AF65-F5344CB8AC3E}">
-        <p14:creationId xmlns:p14="http://schemas.microsoft.com/office/powerpoint/2010/main" val="2105046293"/>
+        <p14:creationId xmlns:p14="http://schemas.microsoft.com/office/powerpoint/2010/main" val="3374961030"/>
       </p:ext>
     </p:extLst>
   </p:cSld>
@@ -535,7 +613,7 @@
 </file>
 
 <file path=ppt/slideLayouts/slideLayout11.xml><?xml version="1.0" encoding="utf-8"?>
-<p:sldLayout xmlns:a="http://schemas.openxmlformats.org/drawingml/2006/main" xmlns:r="http://schemas.openxmlformats.org/officeDocument/2006/relationships" xmlns:p="http://schemas.openxmlformats.org/presentationml/2006/main" type="vertTitleAndTx" preserve="1">
+<p:sldLayout xmlns:a="http://schemas.openxmlformats.org/drawingml/2006/main" xmlns:r="http://schemas.openxmlformats.org/officeDocument/2006/relationships" xmlns:p="http://schemas.openxmlformats.org/presentationml/2006/main" showMasterSp="0" type="vertTitleAndTx" preserve="1">
   <p:cSld name="Vertical Title and Text">
     <p:spTree>
       <p:nvGrpSpPr>
@@ -553,13 +631,83 @@
       </p:grpSpPr>
       <p:sp>
         <p:nvSpPr>
-          <p:cNvPr id="2" name="Vertical Title 1">
-            <a:extLst>
-              <a:ext uri="{FF2B5EF4-FFF2-40B4-BE49-F238E27FC236}">
-                <a16:creationId xmlns:a16="http://schemas.microsoft.com/office/drawing/2014/main" id="{053E723B-38B7-427B-B6A9-310D06473A67}"/>
-              </a:ext>
-            </a:extLst>
-          </p:cNvPr>
+          <p:cNvPr id="7" name="Rectangle 6"/>
+          <p:cNvSpPr/>
+          <p:nvPr/>
+        </p:nvSpPr>
+        <p:spPr>
+          <a:xfrm>
+            <a:off x="3175" y="6400800"/>
+            <a:ext cx="12188825" cy="457200"/>
+          </a:xfrm>
+          <a:prstGeom prst="rect">
+            <a:avLst/>
+          </a:prstGeom>
+          <a:solidFill>
+            <a:schemeClr val="accent2"/>
+          </a:solidFill>
+          <a:ln>
+            <a:noFill/>
+          </a:ln>
+        </p:spPr>
+        <p:style>
+          <a:lnRef idx="2">
+            <a:schemeClr val="accent1">
+              <a:shade val="50000"/>
+            </a:schemeClr>
+          </a:lnRef>
+          <a:fillRef idx="1">
+            <a:schemeClr val="accent1"/>
+          </a:fillRef>
+          <a:effectRef idx="0">
+            <a:schemeClr val="accent1"/>
+          </a:effectRef>
+          <a:fontRef idx="minor">
+            <a:schemeClr val="lt1"/>
+          </a:fontRef>
+        </p:style>
+      </p:sp>
+      <p:sp>
+        <p:nvSpPr>
+          <p:cNvPr id="8" name="Rectangle 7"/>
+          <p:cNvSpPr/>
+          <p:nvPr/>
+        </p:nvSpPr>
+        <p:spPr>
+          <a:xfrm>
+            <a:off x="15" y="6334316"/>
+            <a:ext cx="12188825" cy="64008"/>
+          </a:xfrm>
+          <a:prstGeom prst="rect">
+            <a:avLst/>
+          </a:prstGeom>
+          <a:solidFill>
+            <a:schemeClr val="accent1"/>
+          </a:solidFill>
+          <a:ln>
+            <a:noFill/>
+          </a:ln>
+        </p:spPr>
+        <p:style>
+          <a:lnRef idx="2">
+            <a:schemeClr val="accent1">
+              <a:shade val="50000"/>
+            </a:schemeClr>
+          </a:lnRef>
+          <a:fillRef idx="1">
+            <a:schemeClr val="accent1"/>
+          </a:fillRef>
+          <a:effectRef idx="0">
+            <a:schemeClr val="accent1"/>
+          </a:effectRef>
+          <a:fontRef idx="minor">
+            <a:schemeClr val="lt1"/>
+          </a:fontRef>
+        </p:style>
+      </p:sp>
+      <p:sp>
+        <p:nvSpPr>
+          <p:cNvPr id="2" name="Vertical Title 1"/>
           <p:cNvSpPr>
             <a:spLocks noGrp="1"/>
           </p:cNvSpPr>
@@ -569,8 +717,8 @@
         </p:nvSpPr>
         <p:spPr>
           <a:xfrm>
-            <a:off x="8724900" y="365125"/>
-            <a:ext cx="2628900" cy="5811838"/>
+            <a:off x="8724900" y="414778"/>
+            <a:ext cx="2628900" cy="5757421"/>
           </a:xfrm>
         </p:spPr>
         <p:txBody>
@@ -581,18 +729,13 @@
               <a:rPr lang="en-US"/>
               <a:t>Click to edit Master title style</a:t>
             </a:r>
-          </a:p>
-        </p:txBody>
-      </p:sp>
-      <p:sp>
-        <p:nvSpPr>
-          <p:cNvPr id="3" name="Vertical Text Placeholder 2">
-            <a:extLst>
-              <a:ext uri="{FF2B5EF4-FFF2-40B4-BE49-F238E27FC236}">
-                <a16:creationId xmlns:a16="http://schemas.microsoft.com/office/drawing/2014/main" id="{D3174BF1-229D-4313-BAB3-2B0E367B7680}"/>
-              </a:ext>
-            </a:extLst>
-          </p:cNvPr>
+            <a:endParaRPr lang="en-US" dirty="0"/>
+          </a:p>
+        </p:txBody>
+      </p:sp>
+      <p:sp>
+        <p:nvSpPr>
+          <p:cNvPr id="3" name="Vertical Text Placeholder 2"/>
           <p:cNvSpPr>
             <a:spLocks noGrp="1"/>
           </p:cNvSpPr>
@@ -602,12 +745,12 @@
         </p:nvSpPr>
         <p:spPr>
           <a:xfrm>
-            <a:off x="838200" y="365125"/>
-            <a:ext cx="7734300" cy="5811838"/>
-          </a:xfrm>
-        </p:spPr>
-        <p:txBody>
-          <a:bodyPr vert="eaVert"/>
+            <a:off x="838200" y="414778"/>
+            <a:ext cx="7734300" cy="5757422"/>
+          </a:xfrm>
+        </p:spPr>
+        <p:txBody>
+          <a:bodyPr vert="eaVert" lIns="45720" tIns="0" rIns="45720" bIns="0"/>
           <a:lstStyle/>
           <a:p>
             <a:pPr lvl="0"/>
@@ -643,18 +786,13 @@
               <a:rPr lang="en-US"/>
               <a:t>Fifth level</a:t>
             </a:r>
-          </a:p>
-        </p:txBody>
-      </p:sp>
-      <p:sp>
-        <p:nvSpPr>
-          <p:cNvPr id="4" name="Date Placeholder 3">
-            <a:extLst>
-              <a:ext uri="{FF2B5EF4-FFF2-40B4-BE49-F238E27FC236}">
-                <a16:creationId xmlns:a16="http://schemas.microsoft.com/office/drawing/2014/main" id="{1F85FB09-4A5A-46EC-93F6-FE1B4F96B0EE}"/>
-              </a:ext>
-            </a:extLst>
-          </p:cNvPr>
+            <a:endParaRPr lang="en-US" dirty="0"/>
+          </a:p>
+        </p:txBody>
+      </p:sp>
+      <p:sp>
+        <p:nvSpPr>
+          <p:cNvPr id="4" name="Date Placeholder 3"/>
           <p:cNvSpPr>
             <a:spLocks noGrp="1"/>
           </p:cNvSpPr>
@@ -669,7 +807,7 @@
           <a:p>
             <a:fld id="{33EF576E-7D2A-427A-9890-14E4055C307B}" type="datetimeFigureOut">
               <a:rPr lang="en-US" smtClean="0"/>
-              <a:t>11/1/2017</a:t>
+              <a:t>11/28/2017</a:t>
             </a:fld>
             <a:endParaRPr lang="en-US"/>
           </a:p>
@@ -677,13 +815,7 @@
       </p:sp>
       <p:sp>
         <p:nvSpPr>
-          <p:cNvPr id="5" name="Footer Placeholder 4">
-            <a:extLst>
-              <a:ext uri="{FF2B5EF4-FFF2-40B4-BE49-F238E27FC236}">
-                <a16:creationId xmlns:a16="http://schemas.microsoft.com/office/drawing/2014/main" id="{4CC792A3-0699-417E-A174-DD6D48F4674A}"/>
-              </a:ext>
-            </a:extLst>
-          </p:cNvPr>
+          <p:cNvPr id="5" name="Footer Placeholder 4"/>
           <p:cNvSpPr>
             <a:spLocks noGrp="1"/>
           </p:cNvSpPr>
@@ -702,13 +834,7 @@
       </p:sp>
       <p:sp>
         <p:nvSpPr>
-          <p:cNvPr id="6" name="Slide Number Placeholder 5">
-            <a:extLst>
-              <a:ext uri="{FF2B5EF4-FFF2-40B4-BE49-F238E27FC236}">
-                <a16:creationId xmlns:a16="http://schemas.microsoft.com/office/drawing/2014/main" id="{4AEC3D15-B4FB-4C38-AE9C-A4001DB15E95}"/>
-              </a:ext>
-            </a:extLst>
-          </p:cNvPr>
+          <p:cNvPr id="6" name="Slide Number Placeholder 5"/>
           <p:cNvSpPr>
             <a:spLocks noGrp="1"/>
           </p:cNvSpPr>
@@ -732,7 +858,7 @@
     </p:spTree>
     <p:extLst>
       <p:ext uri="{BB962C8B-B14F-4D97-AF65-F5344CB8AC3E}">
-        <p14:creationId xmlns:p14="http://schemas.microsoft.com/office/powerpoint/2010/main" val="591688928"/>
+        <p14:creationId xmlns:p14="http://schemas.microsoft.com/office/powerpoint/2010/main" val="568922837"/>
       </p:ext>
     </p:extLst>
   </p:cSld>
@@ -761,13 +887,7 @@
       </p:grpSpPr>
       <p:sp>
         <p:nvSpPr>
-          <p:cNvPr id="2" name="Title 1">
-            <a:extLst>
-              <a:ext uri="{FF2B5EF4-FFF2-40B4-BE49-F238E27FC236}">
-                <a16:creationId xmlns:a16="http://schemas.microsoft.com/office/drawing/2014/main" id="{3FA0E3C4-B0BB-4447-9620-169FE542128B}"/>
-              </a:ext>
-            </a:extLst>
-          </p:cNvPr>
+          <p:cNvPr id="2" name="Title 1"/>
           <p:cNvSpPr>
             <a:spLocks noGrp="1"/>
           </p:cNvSpPr>
@@ -778,24 +898,23 @@
         <p:spPr/>
         <p:txBody>
           <a:bodyPr/>
-          <a:lstStyle/>
+          <a:lstStyle>
+            <a:lvl1pPr marL="0">
+              <a:defRPr/>
+            </a:lvl1pPr>
+          </a:lstStyle>
           <a:p>
             <a:r>
               <a:rPr lang="en-US"/>
               <a:t>Click to edit Master title style</a:t>
             </a:r>
-          </a:p>
-        </p:txBody>
-      </p:sp>
-      <p:sp>
-        <p:nvSpPr>
-          <p:cNvPr id="3" name="Content Placeholder 2">
-            <a:extLst>
-              <a:ext uri="{FF2B5EF4-FFF2-40B4-BE49-F238E27FC236}">
-                <a16:creationId xmlns:a16="http://schemas.microsoft.com/office/drawing/2014/main" id="{3BC5662B-EF9C-482B-8590-598777638BBF}"/>
-              </a:ext>
-            </a:extLst>
-          </p:cNvPr>
+            <a:endParaRPr lang="en-US" dirty="0"/>
+          </a:p>
+        </p:txBody>
+      </p:sp>
+      <p:sp>
+        <p:nvSpPr>
+          <p:cNvPr id="3" name="Content Placeholder 2"/>
           <p:cNvSpPr>
             <a:spLocks noGrp="1"/>
           </p:cNvSpPr>
@@ -841,18 +960,13 @@
               <a:rPr lang="en-US"/>
               <a:t>Fifth level</a:t>
             </a:r>
-          </a:p>
-        </p:txBody>
-      </p:sp>
-      <p:sp>
-        <p:nvSpPr>
-          <p:cNvPr id="4" name="Date Placeholder 3">
-            <a:extLst>
-              <a:ext uri="{FF2B5EF4-FFF2-40B4-BE49-F238E27FC236}">
-                <a16:creationId xmlns:a16="http://schemas.microsoft.com/office/drawing/2014/main" id="{685D25CD-54C3-465E-B0C0-A0E68D0B186B}"/>
-              </a:ext>
-            </a:extLst>
-          </p:cNvPr>
+            <a:endParaRPr lang="en-US" dirty="0"/>
+          </a:p>
+        </p:txBody>
+      </p:sp>
+      <p:sp>
+        <p:nvSpPr>
+          <p:cNvPr id="4" name="Date Placeholder 3"/>
           <p:cNvSpPr>
             <a:spLocks noGrp="1"/>
           </p:cNvSpPr>
@@ -867,7 +981,7 @@
           <a:p>
             <a:fld id="{33EF576E-7D2A-427A-9890-14E4055C307B}" type="datetimeFigureOut">
               <a:rPr lang="en-US" smtClean="0"/>
-              <a:t>11/1/2017</a:t>
+              <a:t>11/28/2017</a:t>
             </a:fld>
             <a:endParaRPr lang="en-US"/>
           </a:p>
@@ -875,13 +989,7 @@
       </p:sp>
       <p:sp>
         <p:nvSpPr>
-          <p:cNvPr id="5" name="Footer Placeholder 4">
-            <a:extLst>
-              <a:ext uri="{FF2B5EF4-FFF2-40B4-BE49-F238E27FC236}">
-                <a16:creationId xmlns:a16="http://schemas.microsoft.com/office/drawing/2014/main" id="{C8FC0AD7-30D8-4D2E-A050-69E9594D4FFF}"/>
-              </a:ext>
-            </a:extLst>
-          </p:cNvPr>
+          <p:cNvPr id="5" name="Footer Placeholder 4"/>
           <p:cNvSpPr>
             <a:spLocks noGrp="1"/>
           </p:cNvSpPr>
@@ -900,13 +1008,7 @@
       </p:sp>
       <p:sp>
         <p:nvSpPr>
-          <p:cNvPr id="6" name="Slide Number Placeholder 5">
-            <a:extLst>
-              <a:ext uri="{FF2B5EF4-FFF2-40B4-BE49-F238E27FC236}">
-                <a16:creationId xmlns:a16="http://schemas.microsoft.com/office/drawing/2014/main" id="{D98984DC-65A4-4258-BDBD-E02D904910BC}"/>
-              </a:ext>
-            </a:extLst>
-          </p:cNvPr>
+          <p:cNvPr id="6" name="Slide Number Placeholder 5"/>
           <p:cNvSpPr>
             <a:spLocks noGrp="1"/>
           </p:cNvSpPr>
@@ -930,7 +1032,7 @@
     </p:spTree>
     <p:extLst>
       <p:ext uri="{BB962C8B-B14F-4D97-AF65-F5344CB8AC3E}">
-        <p14:creationId xmlns:p14="http://schemas.microsoft.com/office/powerpoint/2010/main" val="1855925697"/>
+        <p14:creationId xmlns:p14="http://schemas.microsoft.com/office/powerpoint/2010/main" val="634300581"/>
       </p:ext>
     </p:extLst>
   </p:cSld>
@@ -941,8 +1043,16 @@
 </file>
 
 <file path=ppt/slideLayouts/slideLayout3.xml><?xml version="1.0" encoding="utf-8"?>
-<p:sldLayout xmlns:a="http://schemas.openxmlformats.org/drawingml/2006/main" xmlns:r="http://schemas.openxmlformats.org/officeDocument/2006/relationships" xmlns:p="http://schemas.openxmlformats.org/presentationml/2006/main" type="secHead" preserve="1">
+<p:sldLayout xmlns:a="http://schemas.openxmlformats.org/drawingml/2006/main" xmlns:r="http://schemas.openxmlformats.org/officeDocument/2006/relationships" xmlns:p="http://schemas.openxmlformats.org/presentationml/2006/main" showMasterSp="0" type="secHead" preserve="1">
   <p:cSld name="Section Header">
+    <p:bg>
+      <p:bgPr>
+        <a:solidFill>
+          <a:schemeClr val="bg1"/>
+        </a:solidFill>
+        <a:effectLst/>
+      </p:bgPr>
+    </p:bg>
     <p:spTree>
       <p:nvGrpSpPr>
         <p:cNvPr id="1" name=""/>
@@ -959,13 +1069,83 @@
       </p:grpSpPr>
       <p:sp>
         <p:nvSpPr>
-          <p:cNvPr id="2" name="Title 1">
-            <a:extLst>
-              <a:ext uri="{FF2B5EF4-FFF2-40B4-BE49-F238E27FC236}">
-                <a16:creationId xmlns:a16="http://schemas.microsoft.com/office/drawing/2014/main" id="{96C4434A-9D86-4FB9-AA8C-E48E72BCBCD6}"/>
-              </a:ext>
-            </a:extLst>
-          </p:cNvPr>
+          <p:cNvPr id="7" name="Rectangle 6"/>
+          <p:cNvSpPr/>
+          <p:nvPr/>
+        </p:nvSpPr>
+        <p:spPr>
+          <a:xfrm>
+            <a:off x="3175" y="6400800"/>
+            <a:ext cx="12188825" cy="457200"/>
+          </a:xfrm>
+          <a:prstGeom prst="rect">
+            <a:avLst/>
+          </a:prstGeom>
+          <a:solidFill>
+            <a:schemeClr val="accent2"/>
+          </a:solidFill>
+          <a:ln>
+            <a:noFill/>
+          </a:ln>
+        </p:spPr>
+        <p:style>
+          <a:lnRef idx="2">
+            <a:schemeClr val="accent1">
+              <a:shade val="50000"/>
+            </a:schemeClr>
+          </a:lnRef>
+          <a:fillRef idx="1">
+            <a:schemeClr val="accent1"/>
+          </a:fillRef>
+          <a:effectRef idx="0">
+            <a:schemeClr val="accent1"/>
+          </a:effectRef>
+          <a:fontRef idx="minor">
+            <a:schemeClr val="lt1"/>
+          </a:fontRef>
+        </p:style>
+      </p:sp>
+      <p:sp>
+        <p:nvSpPr>
+          <p:cNvPr id="8" name="Rectangle 7"/>
+          <p:cNvSpPr/>
+          <p:nvPr/>
+        </p:nvSpPr>
+        <p:spPr>
+          <a:xfrm>
+            <a:off x="15" y="6334316"/>
+            <a:ext cx="12188825" cy="64008"/>
+          </a:xfrm>
+          <a:prstGeom prst="rect">
+            <a:avLst/>
+          </a:prstGeom>
+          <a:solidFill>
+            <a:schemeClr val="accent1"/>
+          </a:solidFill>
+          <a:ln>
+            <a:noFill/>
+          </a:ln>
+        </p:spPr>
+        <p:style>
+          <a:lnRef idx="2">
+            <a:schemeClr val="accent1">
+              <a:shade val="50000"/>
+            </a:schemeClr>
+          </a:lnRef>
+          <a:fillRef idx="1">
+            <a:schemeClr val="accent1"/>
+          </a:fillRef>
+          <a:effectRef idx="0">
+            <a:schemeClr val="accent1"/>
+          </a:effectRef>
+          <a:fontRef idx="minor">
+            <a:schemeClr val="lt1"/>
+          </a:fontRef>
+        </p:style>
+      </p:sp>
+      <p:sp>
+        <p:nvSpPr>
+          <p:cNvPr id="2" name="Title 1"/>
           <p:cNvSpPr>
             <a:spLocks noGrp="1"/>
           </p:cNvSpPr>
@@ -975,63 +1155,71 @@
         </p:nvSpPr>
         <p:spPr>
           <a:xfrm>
-            <a:off x="831850" y="1709738"/>
-            <a:ext cx="10515600" cy="2852737"/>
-          </a:xfrm>
-        </p:spPr>
-        <p:txBody>
-          <a:bodyPr anchor="b"/>
+            <a:off x="1097280" y="758952"/>
+            <a:ext cx="10058400" cy="3566160"/>
+          </a:xfrm>
+        </p:spPr>
+        <p:txBody>
+          <a:bodyPr anchor="b" anchorCtr="0">
+            <a:normAutofit/>
+          </a:bodyPr>
           <a:lstStyle>
             <a:lvl1pPr>
-              <a:defRPr sz="6000"/>
-            </a:lvl1pPr>
-          </a:lstStyle>
-          <a:p>
-            <a:r>
-              <a:rPr lang="en-US"/>
-              <a:t>Click to edit Master title style</a:t>
-            </a:r>
-          </a:p>
-        </p:txBody>
-      </p:sp>
-      <p:sp>
-        <p:nvSpPr>
-          <p:cNvPr id="3" name="Text Placeholder 2">
-            <a:extLst>
-              <a:ext uri="{FF2B5EF4-FFF2-40B4-BE49-F238E27FC236}">
-                <a16:creationId xmlns:a16="http://schemas.microsoft.com/office/drawing/2014/main" id="{878B984C-9653-426C-A796-5E2450BBE0B2}"/>
-              </a:ext>
-            </a:extLst>
-          </p:cNvPr>
-          <p:cNvSpPr>
-            <a:spLocks noGrp="1"/>
-          </p:cNvSpPr>
-          <p:nvPr>
-            <p:ph type="body" idx="1"/>
-          </p:nvPr>
-        </p:nvSpPr>
-        <p:spPr>
-          <a:xfrm>
-            <a:off x="831850" y="4589463"/>
-            <a:ext cx="10515600" cy="1500187"/>
-          </a:xfrm>
-        </p:spPr>
-        <p:txBody>
-          <a:bodyPr/>
-          <a:lstStyle>
-            <a:lvl1pPr marL="0" indent="0">
-              <a:buNone/>
-              <a:defRPr sz="2400">
+              <a:lnSpc>
+                <a:spcPct val="85000"/>
+              </a:lnSpc>
+              <a:defRPr sz="8000" b="0">
                 <a:solidFill>
                   <a:schemeClr val="tx1">
-                    <a:tint val="75000"/>
+                    <a:lumMod val="85000"/>
+                    <a:lumOff val="15000"/>
                   </a:schemeClr>
                 </a:solidFill>
               </a:defRPr>
             </a:lvl1pPr>
+          </a:lstStyle>
+          <a:p>
+            <a:r>
+              <a:rPr lang="en-US"/>
+              <a:t>Click to edit Master title style</a:t>
+            </a:r>
+            <a:endParaRPr lang="en-US" dirty="0"/>
+          </a:p>
+        </p:txBody>
+      </p:sp>
+      <p:sp>
+        <p:nvSpPr>
+          <p:cNvPr id="3" name="Text Placeholder 2"/>
+          <p:cNvSpPr>
+            <a:spLocks noGrp="1"/>
+          </p:cNvSpPr>
+          <p:nvPr>
+            <p:ph type="body" idx="1"/>
+          </p:nvPr>
+        </p:nvSpPr>
+        <p:spPr>
+          <a:xfrm>
+            <a:off x="1097280" y="4453128"/>
+            <a:ext cx="10058400" cy="1143000"/>
+          </a:xfrm>
+        </p:spPr>
+        <p:txBody>
+          <a:bodyPr lIns="91440" rIns="91440" anchor="t" anchorCtr="0">
+            <a:normAutofit/>
+          </a:bodyPr>
+          <a:lstStyle>
+            <a:lvl1pPr marL="0" indent="0">
+              <a:buNone/>
+              <a:defRPr sz="2400" cap="all" spc="200" baseline="0">
+                <a:solidFill>
+                  <a:schemeClr val="tx2"/>
+                </a:solidFill>
+                <a:latin typeface="+mj-lt"/>
+              </a:defRPr>
+            </a:lvl1pPr>
             <a:lvl2pPr marL="457200" indent="0">
               <a:buNone/>
-              <a:defRPr sz="2000">
+              <a:defRPr sz="1800">
                 <a:solidFill>
                   <a:schemeClr val="tx1">
                     <a:tint val="75000"/>
@@ -1041,7 +1229,7 @@
             </a:lvl2pPr>
             <a:lvl3pPr marL="914400" indent="0">
               <a:buNone/>
-              <a:defRPr sz="1800">
+              <a:defRPr sz="1600">
                 <a:solidFill>
                   <a:schemeClr val="tx1">
                     <a:tint val="75000"/>
@@ -1051,7 +1239,7 @@
             </a:lvl3pPr>
             <a:lvl4pPr marL="1371600" indent="0">
               <a:buNone/>
-              <a:defRPr sz="1600">
+              <a:defRPr sz="1400">
                 <a:solidFill>
                   <a:schemeClr val="tx1">
                     <a:tint val="75000"/>
@@ -1061,7 +1249,7 @@
             </a:lvl4pPr>
             <a:lvl5pPr marL="1828800" indent="0">
               <a:buNone/>
-              <a:defRPr sz="1600">
+              <a:defRPr sz="1400">
                 <a:solidFill>
                   <a:schemeClr val="tx1">
                     <a:tint val="75000"/>
@@ -1071,7 +1259,7 @@
             </a:lvl5pPr>
             <a:lvl6pPr marL="2286000" indent="0">
               <a:buNone/>
-              <a:defRPr sz="1600">
+              <a:defRPr sz="1400">
                 <a:solidFill>
                   <a:schemeClr val="tx1">
                     <a:tint val="75000"/>
@@ -1081,7 +1269,7 @@
             </a:lvl6pPr>
             <a:lvl7pPr marL="2743200" indent="0">
               <a:buNone/>
-              <a:defRPr sz="1600">
+              <a:defRPr sz="1400">
                 <a:solidFill>
                   <a:schemeClr val="tx1">
                     <a:tint val="75000"/>
@@ -1091,7 +1279,7 @@
             </a:lvl7pPr>
             <a:lvl8pPr marL="3200400" indent="0">
               <a:buNone/>
-              <a:defRPr sz="1600">
+              <a:defRPr sz="1400">
                 <a:solidFill>
                   <a:schemeClr val="tx1">
                     <a:tint val="75000"/>
@@ -1101,7 +1289,7 @@
             </a:lvl8pPr>
             <a:lvl9pPr marL="3657600" indent="0">
               <a:buNone/>
-              <a:defRPr sz="1600">
+              <a:defRPr sz="1400">
                 <a:solidFill>
                   <a:schemeClr val="tx1">
                     <a:tint val="75000"/>
@@ -1121,13 +1309,7 @@
       </p:sp>
       <p:sp>
         <p:nvSpPr>
-          <p:cNvPr id="4" name="Date Placeholder 3">
-            <a:extLst>
-              <a:ext uri="{FF2B5EF4-FFF2-40B4-BE49-F238E27FC236}">
-                <a16:creationId xmlns:a16="http://schemas.microsoft.com/office/drawing/2014/main" id="{05D78F6C-0DBB-4A2C-B94C-657F0EE60ECC}"/>
-              </a:ext>
-            </a:extLst>
-          </p:cNvPr>
+          <p:cNvPr id="4" name="Date Placeholder 3"/>
           <p:cNvSpPr>
             <a:spLocks noGrp="1"/>
           </p:cNvSpPr>
@@ -1142,7 +1324,7 @@
           <a:p>
             <a:fld id="{33EF576E-7D2A-427A-9890-14E4055C307B}" type="datetimeFigureOut">
               <a:rPr lang="en-US" smtClean="0"/>
-              <a:t>11/1/2017</a:t>
+              <a:t>11/28/2017</a:t>
             </a:fld>
             <a:endParaRPr lang="en-US"/>
           </a:p>
@@ -1150,13 +1332,7 @@
       </p:sp>
       <p:sp>
         <p:nvSpPr>
-          <p:cNvPr id="5" name="Footer Placeholder 4">
-            <a:extLst>
-              <a:ext uri="{FF2B5EF4-FFF2-40B4-BE49-F238E27FC236}">
-                <a16:creationId xmlns:a16="http://schemas.microsoft.com/office/drawing/2014/main" id="{D8A2B6C9-B3E1-4E5B-A8B0-5BACDF1CA7D3}"/>
-              </a:ext>
-            </a:extLst>
-          </p:cNvPr>
+          <p:cNvPr id="5" name="Footer Placeholder 4"/>
           <p:cNvSpPr>
             <a:spLocks noGrp="1"/>
           </p:cNvSpPr>
@@ -1175,13 +1351,7 @@
       </p:sp>
       <p:sp>
         <p:nvSpPr>
-          <p:cNvPr id="6" name="Slide Number Placeholder 5">
-            <a:extLst>
-              <a:ext uri="{FF2B5EF4-FFF2-40B4-BE49-F238E27FC236}">
-                <a16:creationId xmlns:a16="http://schemas.microsoft.com/office/drawing/2014/main" id="{6BB8E60F-C6F6-4856-BE24-778F78F68553}"/>
-              </a:ext>
-            </a:extLst>
-          </p:cNvPr>
+          <p:cNvPr id="6" name="Slide Number Placeholder 5"/>
           <p:cNvSpPr>
             <a:spLocks noGrp="1"/>
           </p:cNvSpPr>
@@ -1202,10 +1372,48 @@
           </a:p>
         </p:txBody>
       </p:sp>
+      <p:cxnSp>
+        <p:nvCxnSpPr>
+          <p:cNvPr id="9" name="Straight Connector 8"/>
+          <p:cNvCxnSpPr/>
+          <p:nvPr/>
+        </p:nvCxnSpPr>
+        <p:spPr>
+          <a:xfrm>
+            <a:off x="1207658" y="4343400"/>
+            <a:ext cx="9875520" cy="0"/>
+          </a:xfrm>
+          <a:prstGeom prst="line">
+            <a:avLst/>
+          </a:prstGeom>
+          <a:ln w="6350">
+            <a:solidFill>
+              <a:schemeClr val="tx1">
+                <a:lumMod val="50000"/>
+                <a:lumOff val="50000"/>
+              </a:schemeClr>
+            </a:solidFill>
+          </a:ln>
+        </p:spPr>
+        <p:style>
+          <a:lnRef idx="1">
+            <a:schemeClr val="accent1"/>
+          </a:lnRef>
+          <a:fillRef idx="0">
+            <a:schemeClr val="accent1"/>
+          </a:fillRef>
+          <a:effectRef idx="0">
+            <a:schemeClr val="accent1"/>
+          </a:effectRef>
+          <a:fontRef idx="minor">
+            <a:schemeClr val="tx1"/>
+          </a:fontRef>
+        </p:style>
+      </p:cxnSp>
     </p:spTree>
     <p:extLst>
       <p:ext uri="{BB962C8B-B14F-4D97-AF65-F5344CB8AC3E}">
-        <p14:creationId xmlns:p14="http://schemas.microsoft.com/office/powerpoint/2010/main" val="1387159878"/>
+        <p14:creationId xmlns:p14="http://schemas.microsoft.com/office/powerpoint/2010/main" val="3071200295"/>
       </p:ext>
     </p:extLst>
   </p:cSld>
@@ -1234,13 +1442,7 @@
       </p:grpSpPr>
       <p:sp>
         <p:nvSpPr>
-          <p:cNvPr id="2" name="Title 1">
-            <a:extLst>
-              <a:ext uri="{FF2B5EF4-FFF2-40B4-BE49-F238E27FC236}">
-                <a16:creationId xmlns:a16="http://schemas.microsoft.com/office/drawing/2014/main" id="{21D4D345-BB60-4E12-B430-98DED0D0B511}"/>
-              </a:ext>
-            </a:extLst>
-          </p:cNvPr>
+          <p:cNvPr id="8" name="Title 7"/>
           <p:cNvSpPr>
             <a:spLocks noGrp="1"/>
           </p:cNvSpPr>
@@ -1248,7 +1450,12 @@
             <p:ph type="title"/>
           </p:nvPr>
         </p:nvSpPr>
-        <p:spPr/>
+        <p:spPr>
+          <a:xfrm>
+            <a:off x="1097280" y="286603"/>
+            <a:ext cx="10058400" cy="1450757"/>
+          </a:xfrm>
+        </p:spPr>
         <p:txBody>
           <a:bodyPr/>
           <a:lstStyle/>
@@ -1257,18 +1464,13 @@
               <a:rPr lang="en-US"/>
               <a:t>Click to edit Master title style</a:t>
             </a:r>
-          </a:p>
-        </p:txBody>
-      </p:sp>
-      <p:sp>
-        <p:nvSpPr>
-          <p:cNvPr id="3" name="Content Placeholder 2">
-            <a:extLst>
-              <a:ext uri="{FF2B5EF4-FFF2-40B4-BE49-F238E27FC236}">
-                <a16:creationId xmlns:a16="http://schemas.microsoft.com/office/drawing/2014/main" id="{99C983C2-28AB-4894-82D2-11592378F390}"/>
-              </a:ext>
-            </a:extLst>
-          </p:cNvPr>
+            <a:endParaRPr lang="en-US" dirty="0"/>
+          </a:p>
+        </p:txBody>
+      </p:sp>
+      <p:sp>
+        <p:nvSpPr>
+          <p:cNvPr id="3" name="Content Placeholder 2"/>
           <p:cNvSpPr>
             <a:spLocks noGrp="1"/>
           </p:cNvSpPr>
@@ -1278,8 +1480,8 @@
         </p:nvSpPr>
         <p:spPr>
           <a:xfrm>
-            <a:off x="838200" y="1825625"/>
-            <a:ext cx="5181600" cy="4351338"/>
+            <a:off x="1097279" y="1845734"/>
+            <a:ext cx="4937760" cy="4023360"/>
           </a:xfrm>
         </p:spPr>
         <p:txBody>
@@ -1319,18 +1521,13 @@
               <a:rPr lang="en-US"/>
               <a:t>Fifth level</a:t>
             </a:r>
-          </a:p>
-        </p:txBody>
-      </p:sp>
-      <p:sp>
-        <p:nvSpPr>
-          <p:cNvPr id="4" name="Content Placeholder 3">
-            <a:extLst>
-              <a:ext uri="{FF2B5EF4-FFF2-40B4-BE49-F238E27FC236}">
-                <a16:creationId xmlns:a16="http://schemas.microsoft.com/office/drawing/2014/main" id="{775ACA62-A846-4CF8-9510-A4525087F7E8}"/>
-              </a:ext>
-            </a:extLst>
-          </p:cNvPr>
+            <a:endParaRPr lang="en-US" dirty="0"/>
+          </a:p>
+        </p:txBody>
+      </p:sp>
+      <p:sp>
+        <p:nvSpPr>
+          <p:cNvPr id="4" name="Content Placeholder 3"/>
           <p:cNvSpPr>
             <a:spLocks noGrp="1"/>
           </p:cNvSpPr>
@@ -1340,8 +1537,8 @@
         </p:nvSpPr>
         <p:spPr>
           <a:xfrm>
-            <a:off x="6172200" y="1825625"/>
-            <a:ext cx="5181600" cy="4351338"/>
+            <a:off x="6217920" y="1845735"/>
+            <a:ext cx="4937760" cy="4023360"/>
           </a:xfrm>
         </p:spPr>
         <p:txBody>
@@ -1381,18 +1578,13 @@
               <a:rPr lang="en-US"/>
               <a:t>Fifth level</a:t>
             </a:r>
-          </a:p>
-        </p:txBody>
-      </p:sp>
-      <p:sp>
-        <p:nvSpPr>
-          <p:cNvPr id="5" name="Date Placeholder 4">
-            <a:extLst>
-              <a:ext uri="{FF2B5EF4-FFF2-40B4-BE49-F238E27FC236}">
-                <a16:creationId xmlns:a16="http://schemas.microsoft.com/office/drawing/2014/main" id="{667149E7-4BC2-49CF-B131-840062E57FC5}"/>
-              </a:ext>
-            </a:extLst>
-          </p:cNvPr>
+            <a:endParaRPr lang="en-US" dirty="0"/>
+          </a:p>
+        </p:txBody>
+      </p:sp>
+      <p:sp>
+        <p:nvSpPr>
+          <p:cNvPr id="5" name="Date Placeholder 4"/>
           <p:cNvSpPr>
             <a:spLocks noGrp="1"/>
           </p:cNvSpPr>
@@ -1407,7 +1599,7 @@
           <a:p>
             <a:fld id="{33EF576E-7D2A-427A-9890-14E4055C307B}" type="datetimeFigureOut">
               <a:rPr lang="en-US" smtClean="0"/>
-              <a:t>11/1/2017</a:t>
+              <a:t>11/28/2017</a:t>
             </a:fld>
             <a:endParaRPr lang="en-US"/>
           </a:p>
@@ -1415,13 +1607,7 @@
       </p:sp>
       <p:sp>
         <p:nvSpPr>
-          <p:cNvPr id="6" name="Footer Placeholder 5">
-            <a:extLst>
-              <a:ext uri="{FF2B5EF4-FFF2-40B4-BE49-F238E27FC236}">
-                <a16:creationId xmlns:a16="http://schemas.microsoft.com/office/drawing/2014/main" id="{8411595A-B44D-4240-9C79-A8EA0FD89604}"/>
-              </a:ext>
-            </a:extLst>
-          </p:cNvPr>
+          <p:cNvPr id="6" name="Footer Placeholder 5"/>
           <p:cNvSpPr>
             <a:spLocks noGrp="1"/>
           </p:cNvSpPr>
@@ -1440,13 +1626,7 @@
       </p:sp>
       <p:sp>
         <p:nvSpPr>
-          <p:cNvPr id="7" name="Slide Number Placeholder 6">
-            <a:extLst>
-              <a:ext uri="{FF2B5EF4-FFF2-40B4-BE49-F238E27FC236}">
-                <a16:creationId xmlns:a16="http://schemas.microsoft.com/office/drawing/2014/main" id="{825A1C7A-8D6A-4FB8-9BE1-69D465178C7C}"/>
-              </a:ext>
-            </a:extLst>
-          </p:cNvPr>
+          <p:cNvPr id="7" name="Slide Number Placeholder 6"/>
           <p:cNvSpPr>
             <a:spLocks noGrp="1"/>
           </p:cNvSpPr>
@@ -1470,7 +1650,7 @@
     </p:spTree>
     <p:extLst>
       <p:ext uri="{BB962C8B-B14F-4D97-AF65-F5344CB8AC3E}">
-        <p14:creationId xmlns:p14="http://schemas.microsoft.com/office/powerpoint/2010/main" val="1899153415"/>
+        <p14:creationId xmlns:p14="http://schemas.microsoft.com/office/powerpoint/2010/main" val="4104316975"/>
       </p:ext>
     </p:extLst>
   </p:cSld>
@@ -1499,13 +1679,7 @@
       </p:grpSpPr>
       <p:sp>
         <p:nvSpPr>
-          <p:cNvPr id="2" name="Title 1">
-            <a:extLst>
-              <a:ext uri="{FF2B5EF4-FFF2-40B4-BE49-F238E27FC236}">
-                <a16:creationId xmlns:a16="http://schemas.microsoft.com/office/drawing/2014/main" id="{DC2AA4D0-7421-4C23-883F-C774A0748C7A}"/>
-              </a:ext>
-            </a:extLst>
-          </p:cNvPr>
+          <p:cNvPr id="10" name="Title 9"/>
           <p:cNvSpPr>
             <a:spLocks noGrp="1"/>
           </p:cNvSpPr>
@@ -1515,8 +1689,8 @@
         </p:nvSpPr>
         <p:spPr>
           <a:xfrm>
-            <a:off x="839788" y="365125"/>
-            <a:ext cx="10515600" cy="1325563"/>
+            <a:off x="1097280" y="286603"/>
+            <a:ext cx="10058400" cy="1450757"/>
           </a:xfrm>
         </p:spPr>
         <p:txBody>
@@ -1527,18 +1701,13 @@
               <a:rPr lang="en-US"/>
               <a:t>Click to edit Master title style</a:t>
             </a:r>
-          </a:p>
-        </p:txBody>
-      </p:sp>
-      <p:sp>
-        <p:nvSpPr>
-          <p:cNvPr id="3" name="Text Placeholder 2">
-            <a:extLst>
-              <a:ext uri="{FF2B5EF4-FFF2-40B4-BE49-F238E27FC236}">
-                <a16:creationId xmlns:a16="http://schemas.microsoft.com/office/drawing/2014/main" id="{D3440A6F-C772-407F-A482-CC9127379AD2}"/>
-              </a:ext>
-            </a:extLst>
-          </p:cNvPr>
+            <a:endParaRPr lang="en-US" dirty="0"/>
+          </a:p>
+        </p:txBody>
+      </p:sp>
+      <p:sp>
+        <p:nvSpPr>
+          <p:cNvPr id="3" name="Text Placeholder 2"/>
           <p:cNvSpPr>
             <a:spLocks noGrp="1"/>
           </p:cNvSpPr>
@@ -1548,16 +1717,22 @@
         </p:nvSpPr>
         <p:spPr>
           <a:xfrm>
-            <a:off x="839788" y="1681163"/>
-            <a:ext cx="5157787" cy="823912"/>
-          </a:xfrm>
-        </p:spPr>
-        <p:txBody>
-          <a:bodyPr anchor="b"/>
+            <a:off x="1097280" y="1846052"/>
+            <a:ext cx="4937760" cy="736282"/>
+          </a:xfrm>
+        </p:spPr>
+        <p:txBody>
+          <a:bodyPr lIns="91440" rIns="91440" anchor="ctr">
+            <a:normAutofit/>
+          </a:bodyPr>
           <a:lstStyle>
             <a:lvl1pPr marL="0" indent="0">
               <a:buNone/>
-              <a:defRPr sz="2400" b="1"/>
+              <a:defRPr sz="2000" b="0" cap="all" baseline="0">
+                <a:solidFill>
+                  <a:schemeClr val="tx2"/>
+                </a:solidFill>
+              </a:defRPr>
             </a:lvl1pPr>
             <a:lvl2pPr marL="457200" indent="0">
               <a:buNone/>
@@ -1603,13 +1778,7 @@
       </p:sp>
       <p:sp>
         <p:nvSpPr>
-          <p:cNvPr id="4" name="Content Placeholder 3">
-            <a:extLst>
-              <a:ext uri="{FF2B5EF4-FFF2-40B4-BE49-F238E27FC236}">
-                <a16:creationId xmlns:a16="http://schemas.microsoft.com/office/drawing/2014/main" id="{468FECAB-9B4E-465E-88FA-7FFAC033DB19}"/>
-              </a:ext>
-            </a:extLst>
-          </p:cNvPr>
+          <p:cNvPr id="4" name="Content Placeholder 3"/>
           <p:cNvSpPr>
             <a:spLocks noGrp="1"/>
           </p:cNvSpPr>
@@ -1619,8 +1788,8 @@
         </p:nvSpPr>
         <p:spPr>
           <a:xfrm>
-            <a:off x="839788" y="2505075"/>
-            <a:ext cx="5157787" cy="3684588"/>
+            <a:off x="1097280" y="2582334"/>
+            <a:ext cx="4937760" cy="3378200"/>
           </a:xfrm>
         </p:spPr>
         <p:txBody>
@@ -1660,18 +1829,13 @@
               <a:rPr lang="en-US"/>
               <a:t>Fifth level</a:t>
             </a:r>
-          </a:p>
-        </p:txBody>
-      </p:sp>
-      <p:sp>
-        <p:nvSpPr>
-          <p:cNvPr id="5" name="Text Placeholder 4">
-            <a:extLst>
-              <a:ext uri="{FF2B5EF4-FFF2-40B4-BE49-F238E27FC236}">
-                <a16:creationId xmlns:a16="http://schemas.microsoft.com/office/drawing/2014/main" id="{F980E401-CC7E-45E1-899E-B29D979D819E}"/>
-              </a:ext>
-            </a:extLst>
-          </p:cNvPr>
+            <a:endParaRPr lang="en-US" dirty="0"/>
+          </a:p>
+        </p:txBody>
+      </p:sp>
+      <p:sp>
+        <p:nvSpPr>
+          <p:cNvPr id="5" name="Text Placeholder 4"/>
           <p:cNvSpPr>
             <a:spLocks noGrp="1"/>
           </p:cNvSpPr>
@@ -1681,16 +1845,22 @@
         </p:nvSpPr>
         <p:spPr>
           <a:xfrm>
-            <a:off x="6172200" y="1681163"/>
-            <a:ext cx="5183188" cy="823912"/>
-          </a:xfrm>
-        </p:spPr>
-        <p:txBody>
-          <a:bodyPr anchor="b"/>
+            <a:off x="6217920" y="1846052"/>
+            <a:ext cx="4937760" cy="736282"/>
+          </a:xfrm>
+        </p:spPr>
+        <p:txBody>
+          <a:bodyPr lIns="91440" rIns="91440" anchor="ctr">
+            <a:normAutofit/>
+          </a:bodyPr>
           <a:lstStyle>
             <a:lvl1pPr marL="0" indent="0">
               <a:buNone/>
-              <a:defRPr sz="2400" b="1"/>
+              <a:defRPr sz="2000" b="0" cap="all" baseline="0">
+                <a:solidFill>
+                  <a:schemeClr val="tx2"/>
+                </a:solidFill>
+              </a:defRPr>
             </a:lvl1pPr>
             <a:lvl2pPr marL="457200" indent="0">
               <a:buNone/>
@@ -1736,13 +1906,7 @@
       </p:sp>
       <p:sp>
         <p:nvSpPr>
-          <p:cNvPr id="6" name="Content Placeholder 5">
-            <a:extLst>
-              <a:ext uri="{FF2B5EF4-FFF2-40B4-BE49-F238E27FC236}">
-                <a16:creationId xmlns:a16="http://schemas.microsoft.com/office/drawing/2014/main" id="{04B5C1D1-7E09-4122-AD73-6486C0BE3600}"/>
-              </a:ext>
-            </a:extLst>
-          </p:cNvPr>
+          <p:cNvPr id="6" name="Content Placeholder 5"/>
           <p:cNvSpPr>
             <a:spLocks noGrp="1"/>
           </p:cNvSpPr>
@@ -1752,8 +1916,8 @@
         </p:nvSpPr>
         <p:spPr>
           <a:xfrm>
-            <a:off x="6172200" y="2505075"/>
-            <a:ext cx="5183188" cy="3684588"/>
+            <a:off x="6217920" y="2582334"/>
+            <a:ext cx="4937760" cy="3378200"/>
           </a:xfrm>
         </p:spPr>
         <p:txBody>
@@ -1793,18 +1957,13 @@
               <a:rPr lang="en-US"/>
               <a:t>Fifth level</a:t>
             </a:r>
-          </a:p>
-        </p:txBody>
-      </p:sp>
-      <p:sp>
-        <p:nvSpPr>
-          <p:cNvPr id="7" name="Date Placeholder 6">
-            <a:extLst>
-              <a:ext uri="{FF2B5EF4-FFF2-40B4-BE49-F238E27FC236}">
-                <a16:creationId xmlns:a16="http://schemas.microsoft.com/office/drawing/2014/main" id="{E2374A1C-3A8C-4AF7-8995-E8416CD7EBE1}"/>
-              </a:ext>
-            </a:extLst>
-          </p:cNvPr>
+            <a:endParaRPr lang="en-US" dirty="0"/>
+          </a:p>
+        </p:txBody>
+      </p:sp>
+      <p:sp>
+        <p:nvSpPr>
+          <p:cNvPr id="7" name="Date Placeholder 6"/>
           <p:cNvSpPr>
             <a:spLocks noGrp="1"/>
           </p:cNvSpPr>
@@ -1819,7 +1978,7 @@
           <a:p>
             <a:fld id="{33EF576E-7D2A-427A-9890-14E4055C307B}" type="datetimeFigureOut">
               <a:rPr lang="en-US" smtClean="0"/>
-              <a:t>11/1/2017</a:t>
+              <a:t>11/28/2017</a:t>
             </a:fld>
             <a:endParaRPr lang="en-US"/>
           </a:p>
@@ -1827,13 +1986,7 @@
       </p:sp>
       <p:sp>
         <p:nvSpPr>
-          <p:cNvPr id="8" name="Footer Placeholder 7">
-            <a:extLst>
-              <a:ext uri="{FF2B5EF4-FFF2-40B4-BE49-F238E27FC236}">
-                <a16:creationId xmlns:a16="http://schemas.microsoft.com/office/drawing/2014/main" id="{16D5F75D-4BD6-4AC4-9AE5-DC8F3758E1B2}"/>
-              </a:ext>
-            </a:extLst>
-          </p:cNvPr>
+          <p:cNvPr id="8" name="Footer Placeholder 7"/>
           <p:cNvSpPr>
             <a:spLocks noGrp="1"/>
           </p:cNvSpPr>
@@ -1852,13 +2005,7 @@
       </p:sp>
       <p:sp>
         <p:nvSpPr>
-          <p:cNvPr id="9" name="Slide Number Placeholder 8">
-            <a:extLst>
-              <a:ext uri="{FF2B5EF4-FFF2-40B4-BE49-F238E27FC236}">
-                <a16:creationId xmlns:a16="http://schemas.microsoft.com/office/drawing/2014/main" id="{03E9B4C4-8175-497D-BB69-6374D666B515}"/>
-              </a:ext>
-            </a:extLst>
-          </p:cNvPr>
+          <p:cNvPr id="9" name="Slide Number Placeholder 8"/>
           <p:cNvSpPr>
             <a:spLocks noGrp="1"/>
           </p:cNvSpPr>
@@ -1882,7 +2029,7 @@
     </p:spTree>
     <p:extLst>
       <p:ext uri="{BB962C8B-B14F-4D97-AF65-F5344CB8AC3E}">
-        <p14:creationId xmlns:p14="http://schemas.microsoft.com/office/powerpoint/2010/main" val="2885180285"/>
+        <p14:creationId xmlns:p14="http://schemas.microsoft.com/office/powerpoint/2010/main" val="1752231184"/>
       </p:ext>
     </p:extLst>
   </p:cSld>
@@ -1911,13 +2058,7 @@
       </p:grpSpPr>
       <p:sp>
         <p:nvSpPr>
-          <p:cNvPr id="2" name="Title 1">
-            <a:extLst>
-              <a:ext uri="{FF2B5EF4-FFF2-40B4-BE49-F238E27FC236}">
-                <a16:creationId xmlns:a16="http://schemas.microsoft.com/office/drawing/2014/main" id="{0A50E584-4256-4299-834F-E48CD53D005C}"/>
-              </a:ext>
-            </a:extLst>
-          </p:cNvPr>
+          <p:cNvPr id="2" name="Title 1"/>
           <p:cNvSpPr>
             <a:spLocks noGrp="1"/>
           </p:cNvSpPr>
@@ -1934,18 +2075,13 @@
               <a:rPr lang="en-US"/>
               <a:t>Click to edit Master title style</a:t>
             </a:r>
-          </a:p>
-        </p:txBody>
-      </p:sp>
-      <p:sp>
-        <p:nvSpPr>
-          <p:cNvPr id="3" name="Date Placeholder 2">
-            <a:extLst>
-              <a:ext uri="{FF2B5EF4-FFF2-40B4-BE49-F238E27FC236}">
-                <a16:creationId xmlns:a16="http://schemas.microsoft.com/office/drawing/2014/main" id="{B2846285-5408-493F-BE08-1A5BBF2A4AA1}"/>
-              </a:ext>
-            </a:extLst>
-          </p:cNvPr>
+            <a:endParaRPr lang="en-US" dirty="0"/>
+          </a:p>
+        </p:txBody>
+      </p:sp>
+      <p:sp>
+        <p:nvSpPr>
+          <p:cNvPr id="3" name="Date Placeholder 2"/>
           <p:cNvSpPr>
             <a:spLocks noGrp="1"/>
           </p:cNvSpPr>
@@ -1960,7 +2096,7 @@
           <a:p>
             <a:fld id="{33EF576E-7D2A-427A-9890-14E4055C307B}" type="datetimeFigureOut">
               <a:rPr lang="en-US" smtClean="0"/>
-              <a:t>11/1/2017</a:t>
+              <a:t>11/28/2017</a:t>
             </a:fld>
             <a:endParaRPr lang="en-US"/>
           </a:p>
@@ -1968,13 +2104,7 @@
       </p:sp>
       <p:sp>
         <p:nvSpPr>
-          <p:cNvPr id="4" name="Footer Placeholder 3">
-            <a:extLst>
-              <a:ext uri="{FF2B5EF4-FFF2-40B4-BE49-F238E27FC236}">
-                <a16:creationId xmlns:a16="http://schemas.microsoft.com/office/drawing/2014/main" id="{7AED43B0-BDD8-4948-859C-21DD344015F6}"/>
-              </a:ext>
-            </a:extLst>
-          </p:cNvPr>
+          <p:cNvPr id="4" name="Footer Placeholder 3"/>
           <p:cNvSpPr>
             <a:spLocks noGrp="1"/>
           </p:cNvSpPr>
@@ -1993,13 +2123,7 @@
       </p:sp>
       <p:sp>
         <p:nvSpPr>
-          <p:cNvPr id="5" name="Slide Number Placeholder 4">
-            <a:extLst>
-              <a:ext uri="{FF2B5EF4-FFF2-40B4-BE49-F238E27FC236}">
-                <a16:creationId xmlns:a16="http://schemas.microsoft.com/office/drawing/2014/main" id="{F224CC03-56C3-421B-973C-73B7DC1DEA91}"/>
-              </a:ext>
-            </a:extLst>
-          </p:cNvPr>
+          <p:cNvPr id="5" name="Slide Number Placeholder 4"/>
           <p:cNvSpPr>
             <a:spLocks noGrp="1"/>
           </p:cNvSpPr>
@@ -2023,7 +2147,7 @@
     </p:spTree>
     <p:extLst>
       <p:ext uri="{BB962C8B-B14F-4D97-AF65-F5344CB8AC3E}">
-        <p14:creationId xmlns:p14="http://schemas.microsoft.com/office/powerpoint/2010/main" val="213250307"/>
+        <p14:creationId xmlns:p14="http://schemas.microsoft.com/office/powerpoint/2010/main" val="3519279383"/>
       </p:ext>
     </p:extLst>
   </p:cSld>
@@ -2034,7 +2158,7 @@
 </file>
 
 <file path=ppt/slideLayouts/slideLayout7.xml><?xml version="1.0" encoding="utf-8"?>
-<p:sldLayout xmlns:a="http://schemas.openxmlformats.org/drawingml/2006/main" xmlns:r="http://schemas.openxmlformats.org/officeDocument/2006/relationships" xmlns:p="http://schemas.openxmlformats.org/presentationml/2006/main" type="blank" preserve="1">
+<p:sldLayout xmlns:a="http://schemas.openxmlformats.org/drawingml/2006/main" xmlns:r="http://schemas.openxmlformats.org/officeDocument/2006/relationships" xmlns:p="http://schemas.openxmlformats.org/presentationml/2006/main" showMasterSp="0" type="blank" preserve="1">
   <p:cSld name="Blank">
     <p:spTree>
       <p:nvGrpSpPr>
@@ -2050,93 +2174,10 @@
           <a:chExt cx="0" cy="0"/>
         </a:xfrm>
       </p:grpSpPr>
-      <p:sp>
-        <p:nvSpPr>
-          <p:cNvPr id="2" name="Date Placeholder 1">
-            <a:extLst>
-              <a:ext uri="{FF2B5EF4-FFF2-40B4-BE49-F238E27FC236}">
-                <a16:creationId xmlns:a16="http://schemas.microsoft.com/office/drawing/2014/main" id="{CB989215-DDD5-4CEA-8A39-51421ADA99BE}"/>
-              </a:ext>
-            </a:extLst>
-          </p:cNvPr>
-          <p:cNvSpPr>
-            <a:spLocks noGrp="1"/>
-          </p:cNvSpPr>
-          <p:nvPr>
-            <p:ph type="dt" sz="half" idx="10"/>
-          </p:nvPr>
-        </p:nvSpPr>
-        <p:spPr/>
-        <p:txBody>
-          <a:bodyPr/>
-          <a:lstStyle/>
-          <a:p>
-            <a:fld id="{33EF576E-7D2A-427A-9890-14E4055C307B}" type="datetimeFigureOut">
-              <a:rPr lang="en-US" smtClean="0"/>
-              <a:t>11/1/2017</a:t>
-            </a:fld>
-            <a:endParaRPr lang="en-US"/>
-          </a:p>
-        </p:txBody>
-      </p:sp>
-      <p:sp>
-        <p:nvSpPr>
-          <p:cNvPr id="3" name="Footer Placeholder 2">
-            <a:extLst>
-              <a:ext uri="{FF2B5EF4-FFF2-40B4-BE49-F238E27FC236}">
-                <a16:creationId xmlns:a16="http://schemas.microsoft.com/office/drawing/2014/main" id="{FED104C0-41AE-4DC8-89CA-64D779B43075}"/>
-              </a:ext>
-            </a:extLst>
-          </p:cNvPr>
-          <p:cNvSpPr>
-            <a:spLocks noGrp="1"/>
-          </p:cNvSpPr>
-          <p:nvPr>
-            <p:ph type="ftr" sz="quarter" idx="11"/>
-          </p:nvPr>
-        </p:nvSpPr>
-        <p:spPr/>
-        <p:txBody>
-          <a:bodyPr/>
-          <a:lstStyle/>
-          <a:p>
-            <a:endParaRPr lang="en-US"/>
-          </a:p>
-        </p:txBody>
-      </p:sp>
-      <p:sp>
-        <p:nvSpPr>
-          <p:cNvPr id="4" name="Slide Number Placeholder 3">
-            <a:extLst>
-              <a:ext uri="{FF2B5EF4-FFF2-40B4-BE49-F238E27FC236}">
-                <a16:creationId xmlns:a16="http://schemas.microsoft.com/office/drawing/2014/main" id="{43B6E6F3-31E7-40A9-87AC-8C6F67FBF711}"/>
-              </a:ext>
-            </a:extLst>
-          </p:cNvPr>
-          <p:cNvSpPr>
-            <a:spLocks noGrp="1"/>
-          </p:cNvSpPr>
-          <p:nvPr>
-            <p:ph type="sldNum" sz="quarter" idx="12"/>
-          </p:nvPr>
-        </p:nvSpPr>
-        <p:spPr/>
-        <p:txBody>
-          <a:bodyPr/>
-          <a:lstStyle/>
-          <a:p>
-            <a:fld id="{0CDD77A3-0CE9-4993-872A-E9CFDB421FA5}" type="slidenum">
-              <a:rPr lang="en-US" smtClean="0"/>
-              <a:t>‹#›</a:t>
-            </a:fld>
-            <a:endParaRPr lang="en-US"/>
-          </a:p>
-        </p:txBody>
-      </p:sp>
     </p:spTree>
     <p:extLst>
       <p:ext uri="{BB962C8B-B14F-4D97-AF65-F5344CB8AC3E}">
-        <p14:creationId xmlns:p14="http://schemas.microsoft.com/office/powerpoint/2010/main" val="2846433538"/>
+        <p14:creationId xmlns:p14="http://schemas.microsoft.com/office/powerpoint/2010/main" val="2275448753"/>
       </p:ext>
     </p:extLst>
   </p:cSld>
@@ -2147,7 +2188,7 @@
 </file>
 
 <file path=ppt/slideLayouts/slideLayout8.xml><?xml version="1.0" encoding="utf-8"?>
-<p:sldLayout xmlns:a="http://schemas.openxmlformats.org/drawingml/2006/main" xmlns:r="http://schemas.openxmlformats.org/officeDocument/2006/relationships" xmlns:p="http://schemas.openxmlformats.org/presentationml/2006/main" type="objTx" preserve="1">
+<p:sldLayout xmlns:a="http://schemas.openxmlformats.org/drawingml/2006/main" xmlns:r="http://schemas.openxmlformats.org/officeDocument/2006/relationships" xmlns:p="http://schemas.openxmlformats.org/presentationml/2006/main" showMasterSp="0" type="objTx" preserve="1">
   <p:cSld name="Content with Caption">
     <p:spTree>
       <p:nvGrpSpPr>
@@ -2165,13 +2206,83 @@
       </p:grpSpPr>
       <p:sp>
         <p:nvSpPr>
-          <p:cNvPr id="2" name="Title 1">
-            <a:extLst>
-              <a:ext uri="{FF2B5EF4-FFF2-40B4-BE49-F238E27FC236}">
-                <a16:creationId xmlns:a16="http://schemas.microsoft.com/office/drawing/2014/main" id="{5943D3AA-C75C-419F-BB21-106C5592F2C3}"/>
-              </a:ext>
-            </a:extLst>
-          </p:cNvPr>
+          <p:cNvPr id="8" name="Rectangle 7"/>
+          <p:cNvSpPr/>
+          <p:nvPr/>
+        </p:nvSpPr>
+        <p:spPr>
+          <a:xfrm>
+            <a:off x="16" y="0"/>
+            <a:ext cx="4050791" cy="6858000"/>
+          </a:xfrm>
+          <a:prstGeom prst="rect">
+            <a:avLst/>
+          </a:prstGeom>
+          <a:solidFill>
+            <a:schemeClr val="accent2"/>
+          </a:solidFill>
+          <a:ln>
+            <a:noFill/>
+          </a:ln>
+        </p:spPr>
+        <p:style>
+          <a:lnRef idx="2">
+            <a:schemeClr val="accent1">
+              <a:shade val="50000"/>
+            </a:schemeClr>
+          </a:lnRef>
+          <a:fillRef idx="1">
+            <a:schemeClr val="accent1"/>
+          </a:fillRef>
+          <a:effectRef idx="0">
+            <a:schemeClr val="accent1"/>
+          </a:effectRef>
+          <a:fontRef idx="minor">
+            <a:schemeClr val="lt1"/>
+          </a:fontRef>
+        </p:style>
+      </p:sp>
+      <p:sp>
+        <p:nvSpPr>
+          <p:cNvPr id="9" name="Rectangle 8"/>
+          <p:cNvSpPr/>
+          <p:nvPr/>
+        </p:nvSpPr>
+        <p:spPr>
+          <a:xfrm>
+            <a:off x="4040071" y="0"/>
+            <a:ext cx="64008" cy="6858000"/>
+          </a:xfrm>
+          <a:prstGeom prst="rect">
+            <a:avLst/>
+          </a:prstGeom>
+          <a:solidFill>
+            <a:schemeClr val="accent1"/>
+          </a:solidFill>
+          <a:ln>
+            <a:noFill/>
+          </a:ln>
+        </p:spPr>
+        <p:style>
+          <a:lnRef idx="2">
+            <a:schemeClr val="accent1">
+              <a:shade val="50000"/>
+            </a:schemeClr>
+          </a:lnRef>
+          <a:fillRef idx="1">
+            <a:schemeClr val="accent1"/>
+          </a:fillRef>
+          <a:effectRef idx="0">
+            <a:schemeClr val="accent1"/>
+          </a:effectRef>
+          <a:fontRef idx="minor">
+            <a:schemeClr val="lt1"/>
+          </a:fontRef>
+        </p:style>
+      </p:sp>
+      <p:sp>
+        <p:nvSpPr>
+          <p:cNvPr id="2" name="Title 1"/>
           <p:cNvSpPr>
             <a:spLocks noGrp="1"/>
           </p:cNvSpPr>
@@ -2181,15 +2292,21 @@
         </p:nvSpPr>
         <p:spPr>
           <a:xfrm>
-            <a:off x="839788" y="457200"/>
-            <a:ext cx="3932237" cy="1600200"/>
-          </a:xfrm>
-        </p:spPr>
-        <p:txBody>
-          <a:bodyPr anchor="b"/>
+            <a:off x="457200" y="594359"/>
+            <a:ext cx="3200400" cy="2286000"/>
+          </a:xfrm>
+        </p:spPr>
+        <p:txBody>
+          <a:bodyPr anchor="b">
+            <a:normAutofit/>
+          </a:bodyPr>
           <a:lstStyle>
             <a:lvl1pPr>
-              <a:defRPr sz="3200"/>
+              <a:defRPr sz="3600" b="0">
+                <a:solidFill>
+                  <a:srgbClr val="FFFFFF"/>
+                </a:solidFill>
+              </a:defRPr>
             </a:lvl1pPr>
           </a:lstStyle>
           <a:p>
@@ -2197,18 +2314,13 @@
               <a:rPr lang="en-US"/>
               <a:t>Click to edit Master title style</a:t>
             </a:r>
-          </a:p>
-        </p:txBody>
-      </p:sp>
-      <p:sp>
-        <p:nvSpPr>
-          <p:cNvPr id="3" name="Content Placeholder 2">
-            <a:extLst>
-              <a:ext uri="{FF2B5EF4-FFF2-40B4-BE49-F238E27FC236}">
-                <a16:creationId xmlns:a16="http://schemas.microsoft.com/office/drawing/2014/main" id="{8FCF7E62-EF39-4B35-805A-B4E331AE88F1}"/>
-              </a:ext>
-            </a:extLst>
-          </p:cNvPr>
+            <a:endParaRPr lang="en-US" dirty="0"/>
+          </a:p>
+        </p:txBody>
+      </p:sp>
+      <p:sp>
+        <p:nvSpPr>
+          <p:cNvPr id="3" name="Content Placeholder 2"/>
           <p:cNvSpPr>
             <a:spLocks noGrp="1"/>
           </p:cNvSpPr>
@@ -2218,223 +2330,208 @@
         </p:nvSpPr>
         <p:spPr>
           <a:xfrm>
-            <a:off x="5183188" y="987425"/>
-            <a:ext cx="6172200" cy="4873625"/>
-          </a:xfrm>
-        </p:spPr>
+            <a:off x="4800600" y="731520"/>
+            <a:ext cx="6492240" cy="5257800"/>
+          </a:xfrm>
+        </p:spPr>
+        <p:txBody>
+          <a:bodyPr/>
+          <a:lstStyle/>
+          <a:p>
+            <a:pPr lvl="0"/>
+            <a:r>
+              <a:rPr lang="en-US"/>
+              <a:t>Edit Master text styles</a:t>
+            </a:r>
+          </a:p>
+          <a:p>
+            <a:pPr lvl="1"/>
+            <a:r>
+              <a:rPr lang="en-US"/>
+              <a:t>Second level</a:t>
+            </a:r>
+          </a:p>
+          <a:p>
+            <a:pPr lvl="2"/>
+            <a:r>
+              <a:rPr lang="en-US"/>
+              <a:t>Third level</a:t>
+            </a:r>
+          </a:p>
+          <a:p>
+            <a:pPr lvl="3"/>
+            <a:r>
+              <a:rPr lang="en-US"/>
+              <a:t>Fourth level</a:t>
+            </a:r>
+          </a:p>
+          <a:p>
+            <a:pPr lvl="4"/>
+            <a:r>
+              <a:rPr lang="en-US"/>
+              <a:t>Fifth level</a:t>
+            </a:r>
+            <a:endParaRPr lang="en-US" dirty="0"/>
+          </a:p>
+        </p:txBody>
+      </p:sp>
+      <p:sp>
+        <p:nvSpPr>
+          <p:cNvPr id="4" name="Text Placeholder 3"/>
+          <p:cNvSpPr>
+            <a:spLocks noGrp="1"/>
+          </p:cNvSpPr>
+          <p:nvPr>
+            <p:ph type="body" sz="half" idx="2"/>
+          </p:nvPr>
+        </p:nvSpPr>
+        <p:spPr>
+          <a:xfrm>
+            <a:off x="457200" y="2926080"/>
+            <a:ext cx="3200400" cy="3379124"/>
+          </a:xfrm>
+        </p:spPr>
+        <p:txBody>
+          <a:bodyPr lIns="91440" rIns="91440">
+            <a:normAutofit/>
+          </a:bodyPr>
+          <a:lstStyle>
+            <a:lvl1pPr marL="0" indent="0">
+              <a:buNone/>
+              <a:defRPr sz="1500">
+                <a:solidFill>
+                  <a:srgbClr val="FFFFFF"/>
+                </a:solidFill>
+              </a:defRPr>
+            </a:lvl1pPr>
+            <a:lvl2pPr marL="457200" indent="0">
+              <a:buNone/>
+              <a:defRPr sz="1200"/>
+            </a:lvl2pPr>
+            <a:lvl3pPr marL="914400" indent="0">
+              <a:buNone/>
+              <a:defRPr sz="1000"/>
+            </a:lvl3pPr>
+            <a:lvl4pPr marL="1371600" indent="0">
+              <a:buNone/>
+              <a:defRPr sz="900"/>
+            </a:lvl4pPr>
+            <a:lvl5pPr marL="1828800" indent="0">
+              <a:buNone/>
+              <a:defRPr sz="900"/>
+            </a:lvl5pPr>
+            <a:lvl6pPr marL="2286000" indent="0">
+              <a:buNone/>
+              <a:defRPr sz="900"/>
+            </a:lvl6pPr>
+            <a:lvl7pPr marL="2743200" indent="0">
+              <a:buNone/>
+              <a:defRPr sz="900"/>
+            </a:lvl7pPr>
+            <a:lvl8pPr marL="3200400" indent="0">
+              <a:buNone/>
+              <a:defRPr sz="900"/>
+            </a:lvl8pPr>
+            <a:lvl9pPr marL="3657600" indent="0">
+              <a:buNone/>
+              <a:defRPr sz="900"/>
+            </a:lvl9pPr>
+          </a:lstStyle>
+          <a:p>
+            <a:pPr lvl="0"/>
+            <a:r>
+              <a:rPr lang="en-US"/>
+              <a:t>Edit Master text styles</a:t>
+            </a:r>
+          </a:p>
+        </p:txBody>
+      </p:sp>
+      <p:sp>
+        <p:nvSpPr>
+          <p:cNvPr id="5" name="Date Placeholder 4"/>
+          <p:cNvSpPr>
+            <a:spLocks noGrp="1"/>
+          </p:cNvSpPr>
+          <p:nvPr>
+            <p:ph type="dt" sz="half" idx="10"/>
+          </p:nvPr>
+        </p:nvSpPr>
+        <p:spPr>
+          <a:xfrm>
+            <a:off x="465512" y="6459785"/>
+            <a:ext cx="2618510" cy="365125"/>
+          </a:xfrm>
+        </p:spPr>
+        <p:txBody>
+          <a:bodyPr/>
+          <a:lstStyle>
+            <a:lvl1pPr algn="l">
+              <a:defRPr/>
+            </a:lvl1pPr>
+          </a:lstStyle>
+          <a:p>
+            <a:fld id="{33EF576E-7D2A-427A-9890-14E4055C307B}" type="datetimeFigureOut">
+              <a:rPr lang="en-US" smtClean="0"/>
+              <a:t>11/28/2017</a:t>
+            </a:fld>
+            <a:endParaRPr lang="en-US"/>
+          </a:p>
+        </p:txBody>
+      </p:sp>
+      <p:sp>
+        <p:nvSpPr>
+          <p:cNvPr id="6" name="Footer Placeholder 5"/>
+          <p:cNvSpPr>
+            <a:spLocks noGrp="1"/>
+          </p:cNvSpPr>
+          <p:nvPr>
+            <p:ph type="ftr" sz="quarter" idx="11"/>
+          </p:nvPr>
+        </p:nvSpPr>
+        <p:spPr>
+          <a:xfrm>
+            <a:off x="4800600" y="6459785"/>
+            <a:ext cx="4648200" cy="365125"/>
+          </a:xfrm>
+        </p:spPr>
+        <p:txBody>
+          <a:bodyPr/>
+          <a:lstStyle>
+            <a:lvl1pPr algn="l">
+              <a:defRPr>
+                <a:solidFill>
+                  <a:schemeClr val="tx2"/>
+                </a:solidFill>
+              </a:defRPr>
+            </a:lvl1pPr>
+          </a:lstStyle>
+          <a:p>
+            <a:endParaRPr lang="en-US"/>
+          </a:p>
+        </p:txBody>
+      </p:sp>
+      <p:sp>
+        <p:nvSpPr>
+          <p:cNvPr id="7" name="Slide Number Placeholder 6"/>
+          <p:cNvSpPr>
+            <a:spLocks noGrp="1"/>
+          </p:cNvSpPr>
+          <p:nvPr>
+            <p:ph type="sldNum" sz="quarter" idx="12"/>
+          </p:nvPr>
+        </p:nvSpPr>
+        <p:spPr/>
         <p:txBody>
           <a:bodyPr/>
           <a:lstStyle>
             <a:lvl1pPr>
-              <a:defRPr sz="3200"/>
+              <a:defRPr>
+                <a:solidFill>
+                  <a:schemeClr val="tx2"/>
+                </a:solidFill>
+              </a:defRPr>
             </a:lvl1pPr>
-            <a:lvl2pPr>
-              <a:defRPr sz="2800"/>
-            </a:lvl2pPr>
-            <a:lvl3pPr>
-              <a:defRPr sz="2400"/>
-            </a:lvl3pPr>
-            <a:lvl4pPr>
-              <a:defRPr sz="2000"/>
-            </a:lvl4pPr>
-            <a:lvl5pPr>
-              <a:defRPr sz="2000"/>
-            </a:lvl5pPr>
-            <a:lvl6pPr>
-              <a:defRPr sz="2000"/>
-            </a:lvl6pPr>
-            <a:lvl7pPr>
-              <a:defRPr sz="2000"/>
-            </a:lvl7pPr>
-            <a:lvl8pPr>
-              <a:defRPr sz="2000"/>
-            </a:lvl8pPr>
-            <a:lvl9pPr>
-              <a:defRPr sz="2000"/>
-            </a:lvl9pPr>
           </a:lstStyle>
-          <a:p>
-            <a:pPr lvl="0"/>
-            <a:r>
-              <a:rPr lang="en-US"/>
-              <a:t>Edit Master text styles</a:t>
-            </a:r>
-          </a:p>
-          <a:p>
-            <a:pPr lvl="1"/>
-            <a:r>
-              <a:rPr lang="en-US"/>
-              <a:t>Second level</a:t>
-            </a:r>
-          </a:p>
-          <a:p>
-            <a:pPr lvl="2"/>
-            <a:r>
-              <a:rPr lang="en-US"/>
-              <a:t>Third level</a:t>
-            </a:r>
-          </a:p>
-          <a:p>
-            <a:pPr lvl="3"/>
-            <a:r>
-              <a:rPr lang="en-US"/>
-              <a:t>Fourth level</a:t>
-            </a:r>
-          </a:p>
-          <a:p>
-            <a:pPr lvl="4"/>
-            <a:r>
-              <a:rPr lang="en-US"/>
-              <a:t>Fifth level</a:t>
-            </a:r>
-          </a:p>
-        </p:txBody>
-      </p:sp>
-      <p:sp>
-        <p:nvSpPr>
-          <p:cNvPr id="4" name="Text Placeholder 3">
-            <a:extLst>
-              <a:ext uri="{FF2B5EF4-FFF2-40B4-BE49-F238E27FC236}">
-                <a16:creationId xmlns:a16="http://schemas.microsoft.com/office/drawing/2014/main" id="{7B76755C-148E-45AE-B935-623F7A3B3E03}"/>
-              </a:ext>
-            </a:extLst>
-          </p:cNvPr>
-          <p:cNvSpPr>
-            <a:spLocks noGrp="1"/>
-          </p:cNvSpPr>
-          <p:nvPr>
-            <p:ph type="body" sz="half" idx="2"/>
-          </p:nvPr>
-        </p:nvSpPr>
-        <p:spPr>
-          <a:xfrm>
-            <a:off x="839788" y="2057400"/>
-            <a:ext cx="3932237" cy="3811588"/>
-          </a:xfrm>
-        </p:spPr>
-        <p:txBody>
-          <a:bodyPr/>
-          <a:lstStyle>
-            <a:lvl1pPr marL="0" indent="0">
-              <a:buNone/>
-              <a:defRPr sz="1600"/>
-            </a:lvl1pPr>
-            <a:lvl2pPr marL="457200" indent="0">
-              <a:buNone/>
-              <a:defRPr sz="1400"/>
-            </a:lvl2pPr>
-            <a:lvl3pPr marL="914400" indent="0">
-              <a:buNone/>
-              <a:defRPr sz="1200"/>
-            </a:lvl3pPr>
-            <a:lvl4pPr marL="1371600" indent="0">
-              <a:buNone/>
-              <a:defRPr sz="1000"/>
-            </a:lvl4pPr>
-            <a:lvl5pPr marL="1828800" indent="0">
-              <a:buNone/>
-              <a:defRPr sz="1000"/>
-            </a:lvl5pPr>
-            <a:lvl6pPr marL="2286000" indent="0">
-              <a:buNone/>
-              <a:defRPr sz="1000"/>
-            </a:lvl6pPr>
-            <a:lvl7pPr marL="2743200" indent="0">
-              <a:buNone/>
-              <a:defRPr sz="1000"/>
-            </a:lvl7pPr>
-            <a:lvl8pPr marL="3200400" indent="0">
-              <a:buNone/>
-              <a:defRPr sz="1000"/>
-            </a:lvl8pPr>
-            <a:lvl9pPr marL="3657600" indent="0">
-              <a:buNone/>
-              <a:defRPr sz="1000"/>
-            </a:lvl9pPr>
-          </a:lstStyle>
-          <a:p>
-            <a:pPr lvl="0"/>
-            <a:r>
-              <a:rPr lang="en-US"/>
-              <a:t>Edit Master text styles</a:t>
-            </a:r>
-          </a:p>
-        </p:txBody>
-      </p:sp>
-      <p:sp>
-        <p:nvSpPr>
-          <p:cNvPr id="5" name="Date Placeholder 4">
-            <a:extLst>
-              <a:ext uri="{FF2B5EF4-FFF2-40B4-BE49-F238E27FC236}">
-                <a16:creationId xmlns:a16="http://schemas.microsoft.com/office/drawing/2014/main" id="{A6A74DAB-33A6-4756-AB1D-D80BFA4D04DF}"/>
-              </a:ext>
-            </a:extLst>
-          </p:cNvPr>
-          <p:cNvSpPr>
-            <a:spLocks noGrp="1"/>
-          </p:cNvSpPr>
-          <p:nvPr>
-            <p:ph type="dt" sz="half" idx="10"/>
-          </p:nvPr>
-        </p:nvSpPr>
-        <p:spPr/>
-        <p:txBody>
-          <a:bodyPr/>
-          <a:lstStyle/>
-          <a:p>
-            <a:fld id="{33EF576E-7D2A-427A-9890-14E4055C307B}" type="datetimeFigureOut">
-              <a:rPr lang="en-US" smtClean="0"/>
-              <a:t>11/1/2017</a:t>
-            </a:fld>
-            <a:endParaRPr lang="en-US"/>
-          </a:p>
-        </p:txBody>
-      </p:sp>
-      <p:sp>
-        <p:nvSpPr>
-          <p:cNvPr id="6" name="Footer Placeholder 5">
-            <a:extLst>
-              <a:ext uri="{FF2B5EF4-FFF2-40B4-BE49-F238E27FC236}">
-                <a16:creationId xmlns:a16="http://schemas.microsoft.com/office/drawing/2014/main" id="{C98B1021-FB81-4242-B6EE-74FAFD5B98C0}"/>
-              </a:ext>
-            </a:extLst>
-          </p:cNvPr>
-          <p:cNvSpPr>
-            <a:spLocks noGrp="1"/>
-          </p:cNvSpPr>
-          <p:nvPr>
-            <p:ph type="ftr" sz="quarter" idx="11"/>
-          </p:nvPr>
-        </p:nvSpPr>
-        <p:spPr/>
-        <p:txBody>
-          <a:bodyPr/>
-          <a:lstStyle/>
-          <a:p>
-            <a:endParaRPr lang="en-US"/>
-          </a:p>
-        </p:txBody>
-      </p:sp>
-      <p:sp>
-        <p:nvSpPr>
-          <p:cNvPr id="7" name="Slide Number Placeholder 6">
-            <a:extLst>
-              <a:ext uri="{FF2B5EF4-FFF2-40B4-BE49-F238E27FC236}">
-                <a16:creationId xmlns:a16="http://schemas.microsoft.com/office/drawing/2014/main" id="{0E514377-B744-4271-908A-D3635A7D1D9A}"/>
-              </a:ext>
-            </a:extLst>
-          </p:cNvPr>
-          <p:cNvSpPr>
-            <a:spLocks noGrp="1"/>
-          </p:cNvSpPr>
-          <p:nvPr>
-            <p:ph type="sldNum" sz="quarter" idx="12"/>
-          </p:nvPr>
-        </p:nvSpPr>
-        <p:spPr/>
-        <p:txBody>
-          <a:bodyPr/>
-          <a:lstStyle/>
           <a:p>
             <a:fld id="{0CDD77A3-0CE9-4993-872A-E9CFDB421FA5}" type="slidenum">
               <a:rPr lang="en-US" smtClean="0"/>
@@ -2447,7 +2544,7 @@
     </p:spTree>
     <p:extLst>
       <p:ext uri="{BB962C8B-B14F-4D97-AF65-F5344CB8AC3E}">
-        <p14:creationId xmlns:p14="http://schemas.microsoft.com/office/powerpoint/2010/main" val="3811515259"/>
+        <p14:creationId xmlns:p14="http://schemas.microsoft.com/office/powerpoint/2010/main" val="1111591374"/>
       </p:ext>
     </p:extLst>
   </p:cSld>
@@ -2458,7 +2555,7 @@
 </file>
 
 <file path=ppt/slideLayouts/slideLayout9.xml><?xml version="1.0" encoding="utf-8"?>
-<p:sldLayout xmlns:a="http://schemas.openxmlformats.org/drawingml/2006/main" xmlns:r="http://schemas.openxmlformats.org/officeDocument/2006/relationships" xmlns:p="http://schemas.openxmlformats.org/presentationml/2006/main" type="picTx" preserve="1">
+<p:sldLayout xmlns:a="http://schemas.openxmlformats.org/drawingml/2006/main" xmlns:r="http://schemas.openxmlformats.org/officeDocument/2006/relationships" xmlns:p="http://schemas.openxmlformats.org/presentationml/2006/main" showMasterSp="0" type="picTx" preserve="1">
   <p:cSld name="Picture with Caption">
     <p:spTree>
       <p:nvGrpSpPr>
@@ -2476,13 +2573,83 @@
       </p:grpSpPr>
       <p:sp>
         <p:nvSpPr>
-          <p:cNvPr id="2" name="Title 1">
-            <a:extLst>
-              <a:ext uri="{FF2B5EF4-FFF2-40B4-BE49-F238E27FC236}">
-                <a16:creationId xmlns:a16="http://schemas.microsoft.com/office/drawing/2014/main" id="{882BAF0A-6B59-4458-8411-9106D6B00916}"/>
-              </a:ext>
-            </a:extLst>
-          </p:cNvPr>
+          <p:cNvPr id="8" name="Rectangle 7"/>
+          <p:cNvSpPr/>
+          <p:nvPr/>
+        </p:nvSpPr>
+        <p:spPr>
+          <a:xfrm>
+            <a:off x="0" y="4953000"/>
+            <a:ext cx="12188825" cy="1905000"/>
+          </a:xfrm>
+          <a:prstGeom prst="rect">
+            <a:avLst/>
+          </a:prstGeom>
+          <a:solidFill>
+            <a:schemeClr val="accent2"/>
+          </a:solidFill>
+          <a:ln>
+            <a:noFill/>
+          </a:ln>
+        </p:spPr>
+        <p:style>
+          <a:lnRef idx="2">
+            <a:schemeClr val="accent1">
+              <a:shade val="50000"/>
+            </a:schemeClr>
+          </a:lnRef>
+          <a:fillRef idx="1">
+            <a:schemeClr val="accent1"/>
+          </a:fillRef>
+          <a:effectRef idx="0">
+            <a:schemeClr val="accent1"/>
+          </a:effectRef>
+          <a:fontRef idx="minor">
+            <a:schemeClr val="lt1"/>
+          </a:fontRef>
+        </p:style>
+      </p:sp>
+      <p:sp>
+        <p:nvSpPr>
+          <p:cNvPr id="9" name="Rectangle 8"/>
+          <p:cNvSpPr/>
+          <p:nvPr/>
+        </p:nvSpPr>
+        <p:spPr>
+          <a:xfrm>
+            <a:off x="15" y="4915076"/>
+            <a:ext cx="12188825" cy="64008"/>
+          </a:xfrm>
+          <a:prstGeom prst="rect">
+            <a:avLst/>
+          </a:prstGeom>
+          <a:solidFill>
+            <a:schemeClr val="accent1"/>
+          </a:solidFill>
+          <a:ln>
+            <a:noFill/>
+          </a:ln>
+        </p:spPr>
+        <p:style>
+          <a:lnRef idx="2">
+            <a:schemeClr val="accent1">
+              <a:shade val="50000"/>
+            </a:schemeClr>
+          </a:lnRef>
+          <a:fillRef idx="1">
+            <a:schemeClr val="accent1"/>
+          </a:fillRef>
+          <a:effectRef idx="0">
+            <a:schemeClr val="accent1"/>
+          </a:effectRef>
+          <a:fontRef idx="minor">
+            <a:schemeClr val="lt1"/>
+          </a:fontRef>
+        </p:style>
+      </p:sp>
+      <p:sp>
+        <p:nvSpPr>
+          <p:cNvPr id="2" name="Title 1"/>
           <p:cNvSpPr>
             <a:spLocks noGrp="1"/>
           </p:cNvSpPr>
@@ -2492,15 +2659,21 @@
         </p:nvSpPr>
         <p:spPr>
           <a:xfrm>
-            <a:off x="839788" y="457200"/>
-            <a:ext cx="3932237" cy="1600200"/>
-          </a:xfrm>
-        </p:spPr>
-        <p:txBody>
-          <a:bodyPr anchor="b"/>
+            <a:off x="1097280" y="5074920"/>
+            <a:ext cx="10113264" cy="822960"/>
+          </a:xfrm>
+        </p:spPr>
+        <p:txBody>
+          <a:bodyPr lIns="91440" tIns="0" rIns="91440" bIns="0" anchor="b">
+            <a:noAutofit/>
+          </a:bodyPr>
           <a:lstStyle>
             <a:lvl1pPr>
-              <a:defRPr sz="3200"/>
+              <a:defRPr sz="3600" b="0">
+                <a:solidFill>
+                  <a:srgbClr val="FFFFFF"/>
+                </a:solidFill>
+              </a:defRPr>
             </a:lvl1pPr>
           </a:lstStyle>
           <a:p>
@@ -2508,20 +2681,15 @@
               <a:rPr lang="en-US"/>
               <a:t>Click to edit Master title style</a:t>
             </a:r>
-          </a:p>
-        </p:txBody>
-      </p:sp>
-      <p:sp>
-        <p:nvSpPr>
-          <p:cNvPr id="3" name="Picture Placeholder 2">
-            <a:extLst>
-              <a:ext uri="{FF2B5EF4-FFF2-40B4-BE49-F238E27FC236}">
-                <a16:creationId xmlns:a16="http://schemas.microsoft.com/office/drawing/2014/main" id="{1DE7D314-C54C-4158-9163-732AF8263FE2}"/>
-              </a:ext>
-            </a:extLst>
-          </p:cNvPr>
-          <p:cNvSpPr>
-            <a:spLocks noGrp="1"/>
+            <a:endParaRPr lang="en-US" dirty="0"/>
+          </a:p>
+        </p:txBody>
+      </p:sp>
+      <p:sp>
+        <p:nvSpPr>
+          <p:cNvPr id="3" name="Picture Placeholder 2"/>
+          <p:cNvSpPr>
+            <a:spLocks noGrp="1" noChangeAspect="1"/>
           </p:cNvSpPr>
           <p:nvPr>
             <p:ph type="pic" idx="1"/>
@@ -2529,16 +2697,26 @@
         </p:nvSpPr>
         <p:spPr>
           <a:xfrm>
-            <a:off x="5183188" y="987425"/>
-            <a:ext cx="6172200" cy="4873625"/>
-          </a:xfrm>
-        </p:spPr>
-        <p:txBody>
-          <a:bodyPr/>
+            <a:off x="15" y="0"/>
+            <a:ext cx="12191985" cy="4915076"/>
+          </a:xfrm>
+          <a:blipFill>
+            <a:blip r:embed="rId2"/>
+            <a:stretch>
+              <a:fillRect/>
+            </a:stretch>
+          </a:blipFill>
+        </p:spPr>
+        <p:txBody>
+          <a:bodyPr lIns="457200" tIns="457200" anchor="t"/>
           <a:lstStyle>
             <a:lvl1pPr marL="0" indent="0">
               <a:buNone/>
-              <a:defRPr sz="3200"/>
+              <a:defRPr sz="3200">
+                <a:solidFill>
+                  <a:schemeClr val="bg1"/>
+                </a:solidFill>
+              </a:defRPr>
             </a:lvl1pPr>
             <a:lvl2pPr marL="457200" indent="0">
               <a:buNone/>
@@ -2574,19 +2752,17 @@
             </a:lvl9pPr>
           </a:lstStyle>
           <a:p>
-            <a:endParaRPr lang="en-US"/>
-          </a:p>
-        </p:txBody>
-      </p:sp>
-      <p:sp>
-        <p:nvSpPr>
-          <p:cNvPr id="4" name="Text Placeholder 3">
-            <a:extLst>
-              <a:ext uri="{FF2B5EF4-FFF2-40B4-BE49-F238E27FC236}">
-                <a16:creationId xmlns:a16="http://schemas.microsoft.com/office/drawing/2014/main" id="{D47CB1A8-2803-43EF-81A6-CAF4B290712A}"/>
-              </a:ext>
-            </a:extLst>
-          </p:cNvPr>
+            <a:r>
+              <a:rPr lang="en-US"/>
+              <a:t>Click icon to add picture</a:t>
+            </a:r>
+            <a:endParaRPr lang="en-US" dirty="0"/>
+          </a:p>
+        </p:txBody>
+      </p:sp>
+      <p:sp>
+        <p:nvSpPr>
+          <p:cNvPr id="4" name="Text Placeholder 3"/>
           <p:cNvSpPr>
             <a:spLocks noGrp="1"/>
           </p:cNvSpPr>
@@ -2596,48 +2772,60 @@
         </p:nvSpPr>
         <p:spPr>
           <a:xfrm>
-            <a:off x="839788" y="2057400"/>
-            <a:ext cx="3932237" cy="3811588"/>
-          </a:xfrm>
-        </p:spPr>
-        <p:txBody>
-          <a:bodyPr/>
+            <a:off x="1097280" y="5907023"/>
+            <a:ext cx="10113264" cy="594360"/>
+          </a:xfrm>
+        </p:spPr>
+        <p:txBody>
+          <a:bodyPr lIns="91440" tIns="0" rIns="91440" bIns="0">
+            <a:normAutofit/>
+          </a:bodyPr>
           <a:lstStyle>
             <a:lvl1pPr marL="0" indent="0">
-              <a:buNone/>
-              <a:defRPr sz="1600"/>
+              <a:spcBef>
+                <a:spcPts val="0"/>
+              </a:spcBef>
+              <a:spcAft>
+                <a:spcPts val="600"/>
+              </a:spcAft>
+              <a:buNone/>
+              <a:defRPr sz="1500">
+                <a:solidFill>
+                  <a:srgbClr val="FFFFFF"/>
+                </a:solidFill>
+              </a:defRPr>
             </a:lvl1pPr>
             <a:lvl2pPr marL="457200" indent="0">
               <a:buNone/>
-              <a:defRPr sz="1400"/>
+              <a:defRPr sz="1200"/>
             </a:lvl2pPr>
             <a:lvl3pPr marL="914400" indent="0">
               <a:buNone/>
-              <a:defRPr sz="1200"/>
+              <a:defRPr sz="1000"/>
             </a:lvl3pPr>
             <a:lvl4pPr marL="1371600" indent="0">
               <a:buNone/>
-              <a:defRPr sz="1000"/>
+              <a:defRPr sz="900"/>
             </a:lvl4pPr>
             <a:lvl5pPr marL="1828800" indent="0">
               <a:buNone/>
-              <a:defRPr sz="1000"/>
+              <a:defRPr sz="900"/>
             </a:lvl5pPr>
             <a:lvl6pPr marL="2286000" indent="0">
               <a:buNone/>
-              <a:defRPr sz="1000"/>
+              <a:defRPr sz="900"/>
             </a:lvl6pPr>
             <a:lvl7pPr marL="2743200" indent="0">
               <a:buNone/>
-              <a:defRPr sz="1000"/>
+              <a:defRPr sz="900"/>
             </a:lvl7pPr>
             <a:lvl8pPr marL="3200400" indent="0">
               <a:buNone/>
-              <a:defRPr sz="1000"/>
+              <a:defRPr sz="900"/>
             </a:lvl8pPr>
             <a:lvl9pPr marL="3657600" indent="0">
               <a:buNone/>
-              <a:defRPr sz="1000"/>
+              <a:defRPr sz="900"/>
             </a:lvl9pPr>
           </a:lstStyle>
           <a:p>
@@ -2651,13 +2839,7 @@
       </p:sp>
       <p:sp>
         <p:nvSpPr>
-          <p:cNvPr id="5" name="Date Placeholder 4">
-            <a:extLst>
-              <a:ext uri="{FF2B5EF4-FFF2-40B4-BE49-F238E27FC236}">
-                <a16:creationId xmlns:a16="http://schemas.microsoft.com/office/drawing/2014/main" id="{AB11D260-ABD3-4858-937C-BD6C4998705C}"/>
-              </a:ext>
-            </a:extLst>
-          </p:cNvPr>
+          <p:cNvPr id="5" name="Date Placeholder 4"/>
           <p:cNvSpPr>
             <a:spLocks noGrp="1"/>
           </p:cNvSpPr>
@@ -2672,7 +2854,7 @@
           <a:p>
             <a:fld id="{33EF576E-7D2A-427A-9890-14E4055C307B}" type="datetimeFigureOut">
               <a:rPr lang="en-US" smtClean="0"/>
-              <a:t>11/1/2017</a:t>
+              <a:t>11/28/2017</a:t>
             </a:fld>
             <a:endParaRPr lang="en-US"/>
           </a:p>
@@ -2680,13 +2862,7 @@
       </p:sp>
       <p:sp>
         <p:nvSpPr>
-          <p:cNvPr id="6" name="Footer Placeholder 5">
-            <a:extLst>
-              <a:ext uri="{FF2B5EF4-FFF2-40B4-BE49-F238E27FC236}">
-                <a16:creationId xmlns:a16="http://schemas.microsoft.com/office/drawing/2014/main" id="{5CFCB76F-6F93-4D79-B354-04A7D85B08D2}"/>
-              </a:ext>
-            </a:extLst>
-          </p:cNvPr>
+          <p:cNvPr id="6" name="Footer Placeholder 5"/>
           <p:cNvSpPr>
             <a:spLocks noGrp="1"/>
           </p:cNvSpPr>
@@ -2705,13 +2881,7 @@
       </p:sp>
       <p:sp>
         <p:nvSpPr>
-          <p:cNvPr id="7" name="Slide Number Placeholder 6">
-            <a:extLst>
-              <a:ext uri="{FF2B5EF4-FFF2-40B4-BE49-F238E27FC236}">
-                <a16:creationId xmlns:a16="http://schemas.microsoft.com/office/drawing/2014/main" id="{FC745A65-97EF-431C-8A97-7D4D330F99B9}"/>
-              </a:ext>
-            </a:extLst>
-          </p:cNvPr>
+          <p:cNvPr id="7" name="Slide Number Placeholder 6"/>
           <p:cNvSpPr>
             <a:spLocks noGrp="1"/>
           </p:cNvSpPr>
@@ -2735,7 +2905,7 @@
     </p:spTree>
     <p:extLst>
       <p:ext uri="{BB962C8B-B14F-4D97-AF65-F5344CB8AC3E}">
-        <p14:creationId xmlns:p14="http://schemas.microsoft.com/office/powerpoint/2010/main" val="3198805015"/>
+        <p14:creationId xmlns:p14="http://schemas.microsoft.com/office/powerpoint/2010/main" val="2440753222"/>
       </p:ext>
     </p:extLst>
   </p:cSld>
@@ -2769,143 +2939,201 @@
       </p:grpSpPr>
       <p:sp>
         <p:nvSpPr>
-          <p:cNvPr id="2" name="Title Placeholder 1">
-            <a:extLst>
-              <a:ext uri="{FF2B5EF4-FFF2-40B4-BE49-F238E27FC236}">
-                <a16:creationId xmlns:a16="http://schemas.microsoft.com/office/drawing/2014/main" id="{DB0F045B-F1B5-4C39-A7D1-2220E5844A3C}"/>
-              </a:ext>
-            </a:extLst>
-          </p:cNvPr>
-          <p:cNvSpPr>
-            <a:spLocks noGrp="1"/>
-          </p:cNvSpPr>
-          <p:nvPr>
-            <p:ph type="title"/>
-          </p:nvPr>
-        </p:nvSpPr>
-        <p:spPr>
-          <a:xfrm>
-            <a:off x="838200" y="365125"/>
-            <a:ext cx="10515600" cy="1325563"/>
+          <p:cNvPr id="7" name="Rectangle 6"/>
+          <p:cNvSpPr/>
+          <p:nvPr/>
+        </p:nvSpPr>
+        <p:spPr>
+          <a:xfrm>
+            <a:off x="1" y="6400800"/>
+            <a:ext cx="12192000" cy="457200"/>
           </a:xfrm>
           <a:prstGeom prst="rect">
             <a:avLst/>
           </a:prstGeom>
-        </p:spPr>
-        <p:txBody>
-          <a:bodyPr vert="horz" lIns="91440" tIns="45720" rIns="91440" bIns="45720" rtlCol="0" anchor="ctr">
-            <a:normAutofit/>
-          </a:bodyPr>
-          <a:lstStyle/>
-          <a:p>
-            <a:r>
-              <a:rPr lang="en-US"/>
-              <a:t>Click to edit Master title style</a:t>
-            </a:r>
-          </a:p>
-        </p:txBody>
-      </p:sp>
-      <p:sp>
-        <p:nvSpPr>
-          <p:cNvPr id="3" name="Text Placeholder 2">
-            <a:extLst>
-              <a:ext uri="{FF2B5EF4-FFF2-40B4-BE49-F238E27FC236}">
-                <a16:creationId xmlns:a16="http://schemas.microsoft.com/office/drawing/2014/main" id="{10E4211F-7F0F-4BC3-B31C-7A06003C65FE}"/>
-              </a:ext>
-            </a:extLst>
-          </p:cNvPr>
-          <p:cNvSpPr>
-            <a:spLocks noGrp="1"/>
-          </p:cNvSpPr>
-          <p:nvPr>
-            <p:ph type="body" idx="1"/>
-          </p:nvPr>
-        </p:nvSpPr>
-        <p:spPr>
-          <a:xfrm>
-            <a:off x="838200" y="1825625"/>
-            <a:ext cx="10515600" cy="4351338"/>
+          <a:solidFill>
+            <a:schemeClr val="accent2"/>
+          </a:solidFill>
+          <a:ln>
+            <a:noFill/>
+          </a:ln>
+        </p:spPr>
+        <p:style>
+          <a:lnRef idx="2">
+            <a:schemeClr val="accent1">
+              <a:shade val="50000"/>
+            </a:schemeClr>
+          </a:lnRef>
+          <a:fillRef idx="1">
+            <a:schemeClr val="accent1"/>
+          </a:fillRef>
+          <a:effectRef idx="0">
+            <a:schemeClr val="accent1"/>
+          </a:effectRef>
+          <a:fontRef idx="minor">
+            <a:schemeClr val="lt1"/>
+          </a:fontRef>
+        </p:style>
+      </p:sp>
+      <p:sp>
+        <p:nvSpPr>
+          <p:cNvPr id="9" name="Rectangle 8"/>
+          <p:cNvSpPr/>
+          <p:nvPr/>
+        </p:nvSpPr>
+        <p:spPr>
+          <a:xfrm>
+            <a:off x="0" y="6334316"/>
+            <a:ext cx="12192001" cy="65998"/>
           </a:xfrm>
           <a:prstGeom prst="rect">
             <a:avLst/>
           </a:prstGeom>
-        </p:spPr>
-        <p:txBody>
-          <a:bodyPr vert="horz" lIns="91440" tIns="45720" rIns="91440" bIns="45720" rtlCol="0">
-            <a:normAutofit/>
-          </a:bodyPr>
-          <a:lstStyle/>
-          <a:p>
-            <a:pPr lvl="0"/>
-            <a:r>
-              <a:rPr lang="en-US"/>
-              <a:t>Edit Master text styles</a:t>
-            </a:r>
-          </a:p>
-          <a:p>
-            <a:pPr lvl="1"/>
-            <a:r>
-              <a:rPr lang="en-US"/>
-              <a:t>Second level</a:t>
-            </a:r>
-          </a:p>
-          <a:p>
-            <a:pPr lvl="2"/>
-            <a:r>
-              <a:rPr lang="en-US"/>
-              <a:t>Third level</a:t>
-            </a:r>
-          </a:p>
-          <a:p>
-            <a:pPr lvl="3"/>
-            <a:r>
-              <a:rPr lang="en-US"/>
-              <a:t>Fourth level</a:t>
-            </a:r>
-          </a:p>
-          <a:p>
-            <a:pPr lvl="4"/>
-            <a:r>
-              <a:rPr lang="en-US"/>
-              <a:t>Fifth level</a:t>
-            </a:r>
-          </a:p>
-        </p:txBody>
-      </p:sp>
-      <p:sp>
-        <p:nvSpPr>
-          <p:cNvPr id="4" name="Date Placeholder 3">
-            <a:extLst>
-              <a:ext uri="{FF2B5EF4-FFF2-40B4-BE49-F238E27FC236}">
-                <a16:creationId xmlns:a16="http://schemas.microsoft.com/office/drawing/2014/main" id="{275E106A-C150-41E7-906B-03CB27D59EB0}"/>
-              </a:ext>
-            </a:extLst>
-          </p:cNvPr>
-          <p:cNvSpPr>
-            <a:spLocks noGrp="1"/>
-          </p:cNvSpPr>
-          <p:nvPr>
-            <p:ph type="dt" sz="half" idx="2"/>
-          </p:nvPr>
-        </p:nvSpPr>
-        <p:spPr>
-          <a:xfrm>
-            <a:off x="838200" y="6356350"/>
-            <a:ext cx="2743200" cy="365125"/>
+          <a:solidFill>
+            <a:schemeClr val="accent1"/>
+          </a:solidFill>
+          <a:ln>
+            <a:noFill/>
+          </a:ln>
+        </p:spPr>
+        <p:style>
+          <a:lnRef idx="2">
+            <a:schemeClr val="accent1">
+              <a:shade val="50000"/>
+            </a:schemeClr>
+          </a:lnRef>
+          <a:fillRef idx="1">
+            <a:schemeClr val="accent1"/>
+          </a:fillRef>
+          <a:effectRef idx="0">
+            <a:schemeClr val="accent1"/>
+          </a:effectRef>
+          <a:fontRef idx="minor">
+            <a:schemeClr val="lt1"/>
+          </a:fontRef>
+        </p:style>
+      </p:sp>
+      <p:sp>
+        <p:nvSpPr>
+          <p:cNvPr id="2" name="Title Placeholder 1"/>
+          <p:cNvSpPr>
+            <a:spLocks noGrp="1"/>
+          </p:cNvSpPr>
+          <p:nvPr>
+            <p:ph type="title"/>
+          </p:nvPr>
+        </p:nvSpPr>
+        <p:spPr>
+          <a:xfrm>
+            <a:off x="1097280" y="286603"/>
+            <a:ext cx="10058400" cy="1450757"/>
           </a:xfrm>
           <a:prstGeom prst="rect">
             <a:avLst/>
           </a:prstGeom>
         </p:spPr>
         <p:txBody>
+          <a:bodyPr vert="horz" lIns="91440" tIns="45720" rIns="91440" bIns="45720" rtlCol="0" anchor="b">
+            <a:normAutofit/>
+          </a:bodyPr>
+          <a:lstStyle/>
+          <a:p>
+            <a:r>
+              <a:rPr lang="en-US"/>
+              <a:t>Click to edit Master title style</a:t>
+            </a:r>
+            <a:endParaRPr lang="en-US" dirty="0"/>
+          </a:p>
+        </p:txBody>
+      </p:sp>
+      <p:sp>
+        <p:nvSpPr>
+          <p:cNvPr id="3" name="Text Placeholder 2"/>
+          <p:cNvSpPr>
+            <a:spLocks noGrp="1"/>
+          </p:cNvSpPr>
+          <p:nvPr>
+            <p:ph type="body" idx="1"/>
+          </p:nvPr>
+        </p:nvSpPr>
+        <p:spPr>
+          <a:xfrm>
+            <a:off x="1097280" y="1845734"/>
+            <a:ext cx="10058400" cy="4023360"/>
+          </a:xfrm>
+          <a:prstGeom prst="rect">
+            <a:avLst/>
+          </a:prstGeom>
+        </p:spPr>
+        <p:txBody>
+          <a:bodyPr vert="horz" lIns="0" tIns="45720" rIns="0" bIns="45720" rtlCol="0">
+            <a:normAutofit/>
+          </a:bodyPr>
+          <a:lstStyle/>
+          <a:p>
+            <a:pPr lvl="0"/>
+            <a:r>
+              <a:rPr lang="en-US"/>
+              <a:t>Edit Master text styles</a:t>
+            </a:r>
+          </a:p>
+          <a:p>
+            <a:pPr lvl="1"/>
+            <a:r>
+              <a:rPr lang="en-US"/>
+              <a:t>Second level</a:t>
+            </a:r>
+          </a:p>
+          <a:p>
+            <a:pPr lvl="2"/>
+            <a:r>
+              <a:rPr lang="en-US"/>
+              <a:t>Third level</a:t>
+            </a:r>
+          </a:p>
+          <a:p>
+            <a:pPr lvl="3"/>
+            <a:r>
+              <a:rPr lang="en-US"/>
+              <a:t>Fourth level</a:t>
+            </a:r>
+          </a:p>
+          <a:p>
+            <a:pPr lvl="4"/>
+            <a:r>
+              <a:rPr lang="en-US"/>
+              <a:t>Fifth level</a:t>
+            </a:r>
+            <a:endParaRPr lang="en-US" dirty="0"/>
+          </a:p>
+        </p:txBody>
+      </p:sp>
+      <p:sp>
+        <p:nvSpPr>
+          <p:cNvPr id="4" name="Date Placeholder 3"/>
+          <p:cNvSpPr>
+            <a:spLocks noGrp="1"/>
+          </p:cNvSpPr>
+          <p:nvPr>
+            <p:ph type="dt" sz="half" idx="2"/>
+          </p:nvPr>
+        </p:nvSpPr>
+        <p:spPr>
+          <a:xfrm>
+            <a:off x="1097280" y="6459785"/>
+            <a:ext cx="2472271" cy="365125"/>
+          </a:xfrm>
+          <a:prstGeom prst="rect">
+            <a:avLst/>
+          </a:prstGeom>
+        </p:spPr>
+        <p:txBody>
           <a:bodyPr vert="horz" lIns="91440" tIns="45720" rIns="91440" bIns="45720" rtlCol="0" anchor="ctr"/>
           <a:lstStyle>
             <a:lvl1pPr algn="l">
-              <a:defRPr sz="1200">
+              <a:defRPr sz="900">
                 <a:solidFill>
-                  <a:schemeClr val="tx1">
-                    <a:tint val="75000"/>
-                  </a:schemeClr>
+                  <a:srgbClr val="FFFFFF"/>
                 </a:solidFill>
               </a:defRPr>
             </a:lvl1pPr>
@@ -2913,7 +3141,7 @@
           <a:p>
             <a:fld id="{33EF576E-7D2A-427A-9890-14E4055C307B}" type="datetimeFigureOut">
               <a:rPr lang="en-US" smtClean="0"/>
-              <a:t>11/1/2017</a:t>
+              <a:t>11/28/2017</a:t>
             </a:fld>
             <a:endParaRPr lang="en-US"/>
           </a:p>
@@ -2921,13 +3149,7 @@
       </p:sp>
       <p:sp>
         <p:nvSpPr>
-          <p:cNvPr id="5" name="Footer Placeholder 4">
-            <a:extLst>
-              <a:ext uri="{FF2B5EF4-FFF2-40B4-BE49-F238E27FC236}">
-                <a16:creationId xmlns:a16="http://schemas.microsoft.com/office/drawing/2014/main" id="{6F4B6B8A-3A68-41E9-A783-79CAAE155505}"/>
-              </a:ext>
-            </a:extLst>
-          </p:cNvPr>
+          <p:cNvPr id="5" name="Footer Placeholder 4"/>
           <p:cNvSpPr>
             <a:spLocks noGrp="1"/>
           </p:cNvSpPr>
@@ -2937,8 +3159,8 @@
         </p:nvSpPr>
         <p:spPr>
           <a:xfrm>
-            <a:off x="4038600" y="6356350"/>
-            <a:ext cx="4114800" cy="365125"/>
+            <a:off x="3686185" y="6459785"/>
+            <a:ext cx="4822804" cy="365125"/>
           </a:xfrm>
           <a:prstGeom prst="rect">
             <a:avLst/>
@@ -2948,11 +3170,9 @@
           <a:bodyPr vert="horz" lIns="91440" tIns="45720" rIns="91440" bIns="45720" rtlCol="0" anchor="ctr"/>
           <a:lstStyle>
             <a:lvl1pPr algn="ctr">
-              <a:defRPr sz="1200">
+              <a:defRPr sz="900" cap="all" baseline="0">
                 <a:solidFill>
-                  <a:schemeClr val="tx1">
-                    <a:tint val="75000"/>
-                  </a:schemeClr>
+                  <a:srgbClr val="FFFFFF"/>
                 </a:solidFill>
               </a:defRPr>
             </a:lvl1pPr>
@@ -2964,13 +3184,7 @@
       </p:sp>
       <p:sp>
         <p:nvSpPr>
-          <p:cNvPr id="6" name="Slide Number Placeholder 5">
-            <a:extLst>
-              <a:ext uri="{FF2B5EF4-FFF2-40B4-BE49-F238E27FC236}">
-                <a16:creationId xmlns:a16="http://schemas.microsoft.com/office/drawing/2014/main" id="{6331D23D-9F0C-4968-B568-9E0AD3BE4CAB}"/>
-              </a:ext>
-            </a:extLst>
-          </p:cNvPr>
+          <p:cNvPr id="6" name="Slide Number Placeholder 5"/>
           <p:cNvSpPr>
             <a:spLocks noGrp="1"/>
           </p:cNvSpPr>
@@ -2980,8 +3194,8 @@
         </p:nvSpPr>
         <p:spPr>
           <a:xfrm>
-            <a:off x="8610600" y="6356350"/>
-            <a:ext cx="2743200" cy="365125"/>
+            <a:off x="9900458" y="6459785"/>
+            <a:ext cx="1312025" cy="365125"/>
           </a:xfrm>
           <a:prstGeom prst="rect">
             <a:avLst/>
@@ -2991,11 +3205,9 @@
           <a:bodyPr vert="horz" lIns="91440" tIns="45720" rIns="91440" bIns="45720" rtlCol="0" anchor="ctr"/>
           <a:lstStyle>
             <a:lvl1pPr algn="r">
-              <a:defRPr sz="1200">
+              <a:defRPr sz="1050">
                 <a:solidFill>
-                  <a:schemeClr val="tx1">
-                    <a:tint val="75000"/>
-                  </a:schemeClr>
+                  <a:srgbClr val="FFFFFF"/>
                 </a:solidFill>
               </a:defRPr>
             </a:lvl1pPr>
@@ -3009,40 +3221,81 @@
           </a:p>
         </p:txBody>
       </p:sp>
+      <p:cxnSp>
+        <p:nvCxnSpPr>
+          <p:cNvPr id="10" name="Straight Connector 9"/>
+          <p:cNvCxnSpPr/>
+          <p:nvPr/>
+        </p:nvCxnSpPr>
+        <p:spPr>
+          <a:xfrm>
+            <a:off x="1193532" y="1737845"/>
+            <a:ext cx="9966960" cy="0"/>
+          </a:xfrm>
+          <a:prstGeom prst="line">
+            <a:avLst/>
+          </a:prstGeom>
+          <a:ln w="6350">
+            <a:solidFill>
+              <a:schemeClr val="tx1">
+                <a:lumMod val="50000"/>
+                <a:lumOff val="50000"/>
+              </a:schemeClr>
+            </a:solidFill>
+          </a:ln>
+        </p:spPr>
+        <p:style>
+          <a:lnRef idx="1">
+            <a:schemeClr val="accent1"/>
+          </a:lnRef>
+          <a:fillRef idx="0">
+            <a:schemeClr val="accent1"/>
+          </a:fillRef>
+          <a:effectRef idx="0">
+            <a:schemeClr val="accent1"/>
+          </a:effectRef>
+          <a:fontRef idx="minor">
+            <a:schemeClr val="tx1"/>
+          </a:fontRef>
+        </p:style>
+      </p:cxnSp>
     </p:spTree>
     <p:extLst>
       <p:ext uri="{BB962C8B-B14F-4D97-AF65-F5344CB8AC3E}">
-        <p14:creationId xmlns:p14="http://schemas.microsoft.com/office/powerpoint/2010/main" val="4147973093"/>
+        <p14:creationId xmlns:p14="http://schemas.microsoft.com/office/powerpoint/2010/main" val="4117104010"/>
       </p:ext>
     </p:extLst>
   </p:cSld>
   <p:clrMap bg1="lt1" tx1="dk1" bg2="lt2" tx2="dk2" accent1="accent1" accent2="accent2" accent3="accent3" accent4="accent4" accent5="accent5" accent6="accent6" hlink="hlink" folHlink="folHlink"/>
   <p:sldLayoutIdLst>
-    <p:sldLayoutId id="2147483649" r:id="rId1"/>
-    <p:sldLayoutId id="2147483650" r:id="rId2"/>
-    <p:sldLayoutId id="2147483651" r:id="rId3"/>
-    <p:sldLayoutId id="2147483652" r:id="rId4"/>
-    <p:sldLayoutId id="2147483653" r:id="rId5"/>
-    <p:sldLayoutId id="2147483654" r:id="rId6"/>
-    <p:sldLayoutId id="2147483655" r:id="rId7"/>
-    <p:sldLayoutId id="2147483656" r:id="rId8"/>
-    <p:sldLayoutId id="2147483657" r:id="rId9"/>
-    <p:sldLayoutId id="2147483658" r:id="rId10"/>
-    <p:sldLayoutId id="2147483659" r:id="rId11"/>
+    <p:sldLayoutId id="2147483685" r:id="rId1"/>
+    <p:sldLayoutId id="2147483686" r:id="rId2"/>
+    <p:sldLayoutId id="2147483687" r:id="rId3"/>
+    <p:sldLayoutId id="2147483688" r:id="rId4"/>
+    <p:sldLayoutId id="2147483689" r:id="rId5"/>
+    <p:sldLayoutId id="2147483690" r:id="rId6"/>
+    <p:sldLayoutId id="2147483691" r:id="rId7"/>
+    <p:sldLayoutId id="2147483692" r:id="rId8"/>
+    <p:sldLayoutId id="2147483693" r:id="rId9"/>
+    <p:sldLayoutId id="2147483694" r:id="rId10"/>
+    <p:sldLayoutId id="2147483695" r:id="rId11"/>
   </p:sldLayoutIdLst>
   <p:txStyles>
     <p:titleStyle>
       <a:lvl1pPr algn="l" defTabSz="914400" rtl="0" eaLnBrk="1" latinLnBrk="0" hangingPunct="1">
         <a:lnSpc>
-          <a:spcPct val="90000"/>
+          <a:spcPct val="85000"/>
         </a:lnSpc>
         <a:spcBef>
           <a:spcPct val="0"/>
         </a:spcBef>
         <a:buNone/>
-        <a:defRPr sz="4400" kern="1200">
+        <a:defRPr sz="4800" kern="1200" spc="-50" baseline="0">
           <a:solidFill>
-            <a:schemeClr val="tx1"/>
+            <a:schemeClr val="tx1">
+              <a:lumMod val="75000"/>
+              <a:lumOff val="25000"/>
+            </a:schemeClr>
           </a:solidFill>
           <a:latin typeface="+mj-lt"/>
           <a:ea typeface="+mj-ea"/>
@@ -3051,162 +3304,244 @@
       </a:lvl1pPr>
     </p:titleStyle>
     <p:bodyStyle>
-      <a:lvl1pPr marL="228600" indent="-228600" algn="l" defTabSz="914400" rtl="0" eaLnBrk="1" latinLnBrk="0" hangingPunct="1">
+      <a:lvl1pPr marL="91440" indent="-91440" algn="l" defTabSz="914400" rtl="0" eaLnBrk="1" latinLnBrk="0" hangingPunct="1">
         <a:lnSpc>
           <a:spcPct val="90000"/>
         </a:lnSpc>
         <a:spcBef>
-          <a:spcPts val="1000"/>
+          <a:spcPts val="1200"/>
         </a:spcBef>
-        <a:buFont typeface="Arial" panose="020B0604020202020204" pitchFamily="34" charset="0"/>
-        <a:buChar char="•"/>
-        <a:defRPr sz="2800" kern="1200">
+        <a:spcAft>
+          <a:spcPts val="200"/>
+        </a:spcAft>
+        <a:buClr>
+          <a:schemeClr val="accent1"/>
+        </a:buClr>
+        <a:buSzPct val="100000"/>
+        <a:buFont typeface="Calibri" panose="020F0502020204030204" pitchFamily="34" charset="0"/>
+        <a:buChar char=" "/>
+        <a:defRPr sz="2000" kern="1200">
           <a:solidFill>
-            <a:schemeClr val="tx1"/>
+            <a:schemeClr val="tx1">
+              <a:lumMod val="75000"/>
+              <a:lumOff val="25000"/>
+            </a:schemeClr>
           </a:solidFill>
           <a:latin typeface="+mn-lt"/>
           <a:ea typeface="+mn-ea"/>
           <a:cs typeface="+mn-cs"/>
         </a:defRPr>
       </a:lvl1pPr>
-      <a:lvl2pPr marL="685800" indent="-228600" algn="l" defTabSz="914400" rtl="0" eaLnBrk="1" latinLnBrk="0" hangingPunct="1">
+      <a:lvl2pPr marL="384048" indent="-182880" algn="l" defTabSz="914400" rtl="0" eaLnBrk="1" latinLnBrk="0" hangingPunct="1">
         <a:lnSpc>
           <a:spcPct val="90000"/>
         </a:lnSpc>
         <a:spcBef>
-          <a:spcPts val="500"/>
+          <a:spcPts val="200"/>
         </a:spcBef>
-        <a:buFont typeface="Arial" panose="020B0604020202020204" pitchFamily="34" charset="0"/>
-        <a:buChar char="•"/>
-        <a:defRPr sz="2400" kern="1200">
+        <a:spcAft>
+          <a:spcPts val="400"/>
+        </a:spcAft>
+        <a:buClr>
+          <a:schemeClr val="accent1"/>
+        </a:buClr>
+        <a:buFont typeface="Calibri" pitchFamily="34" charset="0"/>
+        <a:buChar char="◦"/>
+        <a:defRPr sz="1800" kern="1200">
           <a:solidFill>
-            <a:schemeClr val="tx1"/>
+            <a:schemeClr val="tx1">
+              <a:lumMod val="75000"/>
+              <a:lumOff val="25000"/>
+            </a:schemeClr>
           </a:solidFill>
           <a:latin typeface="+mn-lt"/>
           <a:ea typeface="+mn-ea"/>
           <a:cs typeface="+mn-cs"/>
         </a:defRPr>
       </a:lvl2pPr>
-      <a:lvl3pPr marL="1143000" indent="-228600" algn="l" defTabSz="914400" rtl="0" eaLnBrk="1" latinLnBrk="0" hangingPunct="1">
+      <a:lvl3pPr marL="566928" indent="-182880" algn="l" defTabSz="914400" rtl="0" eaLnBrk="1" latinLnBrk="0" hangingPunct="1">
         <a:lnSpc>
           <a:spcPct val="90000"/>
         </a:lnSpc>
         <a:spcBef>
-          <a:spcPts val="500"/>
+          <a:spcPts val="200"/>
         </a:spcBef>
-        <a:buFont typeface="Arial" panose="020B0604020202020204" pitchFamily="34" charset="0"/>
-        <a:buChar char="•"/>
-        <a:defRPr sz="2000" kern="1200">
+        <a:spcAft>
+          <a:spcPts val="400"/>
+        </a:spcAft>
+        <a:buClr>
+          <a:schemeClr val="accent1"/>
+        </a:buClr>
+        <a:buFont typeface="Calibri" pitchFamily="34" charset="0"/>
+        <a:buChar char="◦"/>
+        <a:defRPr sz="1400" kern="1200">
           <a:solidFill>
-            <a:schemeClr val="tx1"/>
+            <a:schemeClr val="tx1">
+              <a:lumMod val="75000"/>
+              <a:lumOff val="25000"/>
+            </a:schemeClr>
           </a:solidFill>
           <a:latin typeface="+mn-lt"/>
           <a:ea typeface="+mn-ea"/>
           <a:cs typeface="+mn-cs"/>
         </a:defRPr>
       </a:lvl3pPr>
-      <a:lvl4pPr marL="1600200" indent="-228600" algn="l" defTabSz="914400" rtl="0" eaLnBrk="1" latinLnBrk="0" hangingPunct="1">
+      <a:lvl4pPr marL="749808" indent="-182880" algn="l" defTabSz="914400" rtl="0" eaLnBrk="1" latinLnBrk="0" hangingPunct="1">
         <a:lnSpc>
           <a:spcPct val="90000"/>
         </a:lnSpc>
         <a:spcBef>
-          <a:spcPts val="500"/>
+          <a:spcPts val="200"/>
         </a:spcBef>
-        <a:buFont typeface="Arial" panose="020B0604020202020204" pitchFamily="34" charset="0"/>
-        <a:buChar char="•"/>
-        <a:defRPr sz="1800" kern="1200">
+        <a:spcAft>
+          <a:spcPts val="400"/>
+        </a:spcAft>
+        <a:buClr>
+          <a:schemeClr val="accent1"/>
+        </a:buClr>
+        <a:buFont typeface="Calibri" pitchFamily="34" charset="0"/>
+        <a:buChar char="◦"/>
+        <a:defRPr sz="1400" kern="1200">
           <a:solidFill>
-            <a:schemeClr val="tx1"/>
+            <a:schemeClr val="tx1">
+              <a:lumMod val="75000"/>
+              <a:lumOff val="25000"/>
+            </a:schemeClr>
           </a:solidFill>
           <a:latin typeface="+mn-lt"/>
           <a:ea typeface="+mn-ea"/>
           <a:cs typeface="+mn-cs"/>
         </a:defRPr>
       </a:lvl4pPr>
-      <a:lvl5pPr marL="2057400" indent="-228600" algn="l" defTabSz="914400" rtl="0" eaLnBrk="1" latinLnBrk="0" hangingPunct="1">
+      <a:lvl5pPr marL="932688" indent="-182880" algn="l" defTabSz="914400" rtl="0" eaLnBrk="1" latinLnBrk="0" hangingPunct="1">
         <a:lnSpc>
           <a:spcPct val="90000"/>
         </a:lnSpc>
         <a:spcBef>
-          <a:spcPts val="500"/>
+          <a:spcPts val="200"/>
         </a:spcBef>
-        <a:buFont typeface="Arial" panose="020B0604020202020204" pitchFamily="34" charset="0"/>
-        <a:buChar char="•"/>
-        <a:defRPr sz="1800" kern="1200">
+        <a:spcAft>
+          <a:spcPts val="400"/>
+        </a:spcAft>
+        <a:buClr>
+          <a:schemeClr val="accent1"/>
+        </a:buClr>
+        <a:buFont typeface="Calibri" pitchFamily="34" charset="0"/>
+        <a:buChar char="◦"/>
+        <a:defRPr sz="1400" kern="1200">
           <a:solidFill>
-            <a:schemeClr val="tx1"/>
+            <a:schemeClr val="tx1">
+              <a:lumMod val="75000"/>
+              <a:lumOff val="25000"/>
+            </a:schemeClr>
           </a:solidFill>
           <a:latin typeface="+mn-lt"/>
           <a:ea typeface="+mn-ea"/>
           <a:cs typeface="+mn-cs"/>
         </a:defRPr>
       </a:lvl5pPr>
-      <a:lvl6pPr marL="2514600" indent="-228600" algn="l" defTabSz="914400" rtl="0" eaLnBrk="1" latinLnBrk="0" hangingPunct="1">
+      <a:lvl6pPr marL="1100000" indent="-228600" algn="l" defTabSz="914400" rtl="0" eaLnBrk="1" latinLnBrk="0" hangingPunct="1">
         <a:lnSpc>
           <a:spcPct val="90000"/>
         </a:lnSpc>
         <a:spcBef>
-          <a:spcPts val="500"/>
+          <a:spcPts val="200"/>
         </a:spcBef>
-        <a:buFont typeface="Arial" panose="020B0604020202020204" pitchFamily="34" charset="0"/>
-        <a:buChar char="•"/>
-        <a:defRPr sz="1800" kern="1200">
+        <a:spcAft>
+          <a:spcPts val="400"/>
+        </a:spcAft>
+        <a:buClr>
+          <a:schemeClr val="accent1"/>
+        </a:buClr>
+        <a:buFont typeface="Calibri" pitchFamily="34" charset="0"/>
+        <a:buChar char="◦"/>
+        <a:defRPr sz="1400" kern="1200">
           <a:solidFill>
-            <a:schemeClr val="tx1"/>
+            <a:schemeClr val="tx1">
+              <a:lumMod val="75000"/>
+              <a:lumOff val="25000"/>
+            </a:schemeClr>
           </a:solidFill>
           <a:latin typeface="+mn-lt"/>
           <a:ea typeface="+mn-ea"/>
           <a:cs typeface="+mn-cs"/>
         </a:defRPr>
       </a:lvl6pPr>
-      <a:lvl7pPr marL="2971800" indent="-228600" algn="l" defTabSz="914400" rtl="0" eaLnBrk="1" latinLnBrk="0" hangingPunct="1">
+      <a:lvl7pPr marL="1300000" indent="-228600" algn="l" defTabSz="914400" rtl="0" eaLnBrk="1" latinLnBrk="0" hangingPunct="1">
         <a:lnSpc>
           <a:spcPct val="90000"/>
         </a:lnSpc>
         <a:spcBef>
-          <a:spcPts val="500"/>
+          <a:spcPts val="200"/>
         </a:spcBef>
-        <a:buFont typeface="Arial" panose="020B0604020202020204" pitchFamily="34" charset="0"/>
-        <a:buChar char="•"/>
-        <a:defRPr sz="1800" kern="1200">
+        <a:spcAft>
+          <a:spcPts val="400"/>
+        </a:spcAft>
+        <a:buClr>
+          <a:schemeClr val="accent1"/>
+        </a:buClr>
+        <a:buFont typeface="Calibri" pitchFamily="34" charset="0"/>
+        <a:buChar char="◦"/>
+        <a:defRPr sz="1400" kern="1200">
           <a:solidFill>
-            <a:schemeClr val="tx1"/>
+            <a:schemeClr val="tx1">
+              <a:lumMod val="75000"/>
+              <a:lumOff val="25000"/>
+            </a:schemeClr>
           </a:solidFill>
           <a:latin typeface="+mn-lt"/>
           <a:ea typeface="+mn-ea"/>
           <a:cs typeface="+mn-cs"/>
         </a:defRPr>
       </a:lvl7pPr>
-      <a:lvl8pPr marL="3429000" indent="-228600" algn="l" defTabSz="914400" rtl="0" eaLnBrk="1" latinLnBrk="0" hangingPunct="1">
+      <a:lvl8pPr marL="1500000" indent="-228600" algn="l" defTabSz="914400" rtl="0" eaLnBrk="1" latinLnBrk="0" hangingPunct="1">
         <a:lnSpc>
           <a:spcPct val="90000"/>
         </a:lnSpc>
         <a:spcBef>
-          <a:spcPts val="500"/>
+          <a:spcPts val="200"/>
         </a:spcBef>
-        <a:buFont typeface="Arial" panose="020B0604020202020204" pitchFamily="34" charset="0"/>
-        <a:buChar char="•"/>
-        <a:defRPr sz="1800" kern="1200">
+        <a:spcAft>
+          <a:spcPts val="400"/>
+        </a:spcAft>
+        <a:buClr>
+          <a:schemeClr val="accent1"/>
+        </a:buClr>
+        <a:buFont typeface="Calibri" pitchFamily="34" charset="0"/>
+        <a:buChar char="◦"/>
+        <a:defRPr sz="1400" kern="1200">
           <a:solidFill>
-            <a:schemeClr val="tx1"/>
+            <a:schemeClr val="tx1">
+              <a:lumMod val="75000"/>
+              <a:lumOff val="25000"/>
+            </a:schemeClr>
           </a:solidFill>
           <a:latin typeface="+mn-lt"/>
           <a:ea typeface="+mn-ea"/>
           <a:cs typeface="+mn-cs"/>
         </a:defRPr>
       </a:lvl8pPr>
-      <a:lvl9pPr marL="3886200" indent="-228600" algn="l" defTabSz="914400" rtl="0" eaLnBrk="1" latinLnBrk="0" hangingPunct="1">
+      <a:lvl9pPr marL="1700000" indent="-228600" algn="l" defTabSz="914400" rtl="0" eaLnBrk="1" latinLnBrk="0" hangingPunct="1">
         <a:lnSpc>
           <a:spcPct val="90000"/>
         </a:lnSpc>
         <a:spcBef>
-          <a:spcPts val="500"/>
+          <a:spcPts val="200"/>
         </a:spcBef>
-        <a:buFont typeface="Arial" panose="020B0604020202020204" pitchFamily="34" charset="0"/>
-        <a:buChar char="•"/>
-        <a:defRPr sz="1800" kern="1200">
+        <a:spcAft>
+          <a:spcPts val="400"/>
+        </a:spcAft>
+        <a:buClr>
+          <a:schemeClr val="accent1"/>
+        </a:buClr>
+        <a:buFont typeface="Calibri" pitchFamily="34" charset="0"/>
+        <a:buChar char="◦"/>
+        <a:defRPr sz="1400" kern="1200">
           <a:solidFill>
-            <a:schemeClr val="tx1"/>
+            <a:schemeClr val="tx1">
+              <a:lumMod val="75000"/>
+              <a:lumOff val="25000"/>
+            </a:schemeClr>
           </a:solidFill>
           <a:latin typeface="+mn-lt"/>
           <a:ea typeface="+mn-ea"/>
@@ -3351,7 +3686,10 @@
           <a:bodyPr/>
           <a:lstStyle/>
           <a:p>
-            <a:endParaRPr lang="en-US"/>
+            <a:r>
+              <a:rPr lang="en-US" dirty="0"/>
+              <a:t>Casting 305</a:t>
+            </a:r>
           </a:p>
         </p:txBody>
       </p:sp>
@@ -3376,7 +3714,10 @@
           <a:bodyPr/>
           <a:lstStyle/>
           <a:p>
-            <a:endParaRPr lang="en-US"/>
+            <a:r>
+              <a:rPr lang="en-US" dirty="0"/>
+              <a:t>Talent Presentation</a:t>
+            </a:r>
           </a:p>
         </p:txBody>
       </p:sp>
@@ -3393,55 +3734,85 @@
 </p:sld>
 </file>
 
+<file path=ppt/slides/slide2.xml><?xml version="1.0" encoding="utf-8"?>
+<p:sld xmlns:a="http://schemas.openxmlformats.org/drawingml/2006/main" xmlns:r="http://schemas.openxmlformats.org/officeDocument/2006/relationships" xmlns:p="http://schemas.openxmlformats.org/presentationml/2006/main">
+  <p:cSld>
+    <p:spTree>
+      <p:nvGrpSpPr>
+        <p:cNvPr id="1" name=""/>
+        <p:cNvGrpSpPr/>
+        <p:nvPr/>
+      </p:nvGrpSpPr>
+      <p:grpSpPr>
+        <a:xfrm>
+          <a:off x="0" y="0"/>
+          <a:ext cx="0" cy="0"/>
+          <a:chOff x="0" y="0"/>
+          <a:chExt cx="0" cy="0"/>
+        </a:xfrm>
+      </p:grpSpPr>
+    </p:spTree>
+    <p:extLst>
+      <p:ext uri="{BB962C8B-B14F-4D97-AF65-F5344CB8AC3E}">
+        <p14:creationId xmlns:p14="http://schemas.microsoft.com/office/powerpoint/2010/main" val="2112452181"/>
+      </p:ext>
+    </p:extLst>
+  </p:cSld>
+  <p:clrMapOvr>
+    <a:masterClrMapping/>
+  </p:clrMapOvr>
+</p:sld>
+</file>
+
 <file path=ppt/theme/theme1.xml><?xml version="1.0" encoding="utf-8"?>
-<a:theme xmlns:a="http://schemas.openxmlformats.org/drawingml/2006/main" name="Office Theme">
+<a:theme xmlns:a="http://schemas.openxmlformats.org/drawingml/2006/main" name="Retrospect">
   <a:themeElements>
-    <a:clrScheme name="Office">
+    <a:clrScheme name="Retrospect">
       <a:dk1>
-        <a:sysClr val="windowText" lastClr="000000"/>
+        <a:srgbClr val="000000"/>
       </a:dk1>
       <a:lt1>
         <a:sysClr val="window" lastClr="FFFFFF"/>
       </a:lt1>
       <a:dk2>
-        <a:srgbClr val="44546A"/>
+        <a:srgbClr val="637052"/>
       </a:dk2>
       <a:lt2>
-        <a:srgbClr val="E7E6E6"/>
+        <a:srgbClr val="CCDDEA"/>
       </a:lt2>
       <a:accent1>
-        <a:srgbClr val="4472C4"/>
+        <a:srgbClr val="E48312"/>
       </a:accent1>
       <a:accent2>
-        <a:srgbClr val="ED7D31"/>
+        <a:srgbClr val="BD582C"/>
       </a:accent2>
       <a:accent3>
-        <a:srgbClr val="A5A5A5"/>
+        <a:srgbClr val="865640"/>
       </a:accent3>
       <a:accent4>
-        <a:srgbClr val="FFC000"/>
+        <a:srgbClr val="9B8357"/>
       </a:accent4>
       <a:accent5>
-        <a:srgbClr val="5B9BD5"/>
+        <a:srgbClr val="C2BC80"/>
       </a:accent5>
       <a:accent6>
-        <a:srgbClr val="70AD47"/>
+        <a:srgbClr val="94A088"/>
       </a:accent6>
       <a:hlink>
-        <a:srgbClr val="0563C1"/>
+        <a:srgbClr val="2998E3"/>
       </a:hlink>
       <a:folHlink>
-        <a:srgbClr val="954F72"/>
+        <a:srgbClr val="8C8C8C"/>
       </a:folHlink>
     </a:clrScheme>
-    <a:fontScheme name="Office">
+    <a:fontScheme name="Retrospect">
       <a:majorFont>
         <a:latin typeface="Calibri Light" panose="020F0302020204030204"/>
         <a:ea typeface=""/>
         <a:cs typeface=""/>
-        <a:font script="Jpan" typeface="游ゴシック Light"/>
+        <a:font script="Jpan" typeface="ＭＳ Ｐゴシック"/>
         <a:font script="Hang" typeface="맑은 고딕"/>
-        <a:font script="Hans" typeface="等线 Light"/>
+        <a:font script="Hans" typeface="宋体"/>
         <a:font script="Hant" typeface="新細明體"/>
         <a:font script="Arab" typeface="Times New Roman"/>
         <a:font script="Hebr" typeface="Times New Roman"/>
@@ -3469,31 +3840,14 @@
         <a:font script="Viet" typeface="Times New Roman"/>
         <a:font script="Uigh" typeface="Microsoft Uighur"/>
         <a:font script="Geor" typeface="Sylfaen"/>
-        <a:font script="Armn" typeface="Arial"/>
-        <a:font script="Bugi" typeface="Leelawadee UI"/>
-        <a:font script="Bopo" typeface="Microsoft JhengHei"/>
-        <a:font script="Java" typeface="Javanese Text"/>
-        <a:font script="Lisu" typeface="Segoe UI"/>
-        <a:font script="Mymr" typeface="Myanmar Text"/>
-        <a:font script="Nkoo" typeface="Ebrima"/>
-        <a:font script="Olck" typeface="Nirmala UI"/>
-        <a:font script="Osma" typeface="Ebrima"/>
-        <a:font script="Phag" typeface="Phagspa"/>
-        <a:font script="Syrn" typeface="Estrangelo Edessa"/>
-        <a:font script="Syrj" typeface="Estrangelo Edessa"/>
-        <a:font script="Syre" typeface="Estrangelo Edessa"/>
-        <a:font script="Sora" typeface="Nirmala UI"/>
-        <a:font script="Tale" typeface="Microsoft Tai Le"/>
-        <a:font script="Talu" typeface="Microsoft New Tai Lue"/>
-        <a:font script="Tfng" typeface="Ebrima"/>
       </a:majorFont>
       <a:minorFont>
         <a:latin typeface="Calibri" panose="020F0502020204030204"/>
         <a:ea typeface=""/>
         <a:cs typeface=""/>
-        <a:font script="Jpan" typeface="游ゴシック"/>
+        <a:font script="Jpan" typeface="ＭＳ Ｐゴシック"/>
         <a:font script="Hang" typeface="맑은 고딕"/>
-        <a:font script="Hans" typeface="等线"/>
+        <a:font script="Hans" typeface="宋体"/>
         <a:font script="Hant" typeface="新細明體"/>
         <a:font script="Arab" typeface="Arial"/>
         <a:font script="Hebr" typeface="Arial"/>
@@ -3521,26 +3875,9 @@
         <a:font script="Viet" typeface="Arial"/>
         <a:font script="Uigh" typeface="Microsoft Uighur"/>
         <a:font script="Geor" typeface="Sylfaen"/>
-        <a:font script="Armn" typeface="Arial"/>
-        <a:font script="Bugi" typeface="Leelawadee UI"/>
-        <a:font script="Bopo" typeface="Microsoft JhengHei"/>
-        <a:font script="Java" typeface="Javanese Text"/>
-        <a:font script="Lisu" typeface="Segoe UI"/>
-        <a:font script="Mymr" typeface="Myanmar Text"/>
-        <a:font script="Nkoo" typeface="Ebrima"/>
-        <a:font script="Olck" typeface="Nirmala UI"/>
-        <a:font script="Osma" typeface="Ebrima"/>
-        <a:font script="Phag" typeface="Phagspa"/>
-        <a:font script="Syrn" typeface="Estrangelo Edessa"/>
-        <a:font script="Syrj" typeface="Estrangelo Edessa"/>
-        <a:font script="Syre" typeface="Estrangelo Edessa"/>
-        <a:font script="Sora" typeface="Nirmala UI"/>
-        <a:font script="Tale" typeface="Microsoft Tai Le"/>
-        <a:font script="Talu" typeface="Microsoft New Tai Lue"/>
-        <a:font script="Tfng" typeface="Ebrima"/>
       </a:minorFont>
     </a:fontScheme>
-    <a:fmtScheme name="Office">
+    <a:fmtScheme name="Retrospect">
       <a:fillStyleLst>
         <a:solidFill>
           <a:schemeClr val="phClr"/>
@@ -3549,76 +3886,81 @@
           <a:gsLst>
             <a:gs pos="0">
               <a:schemeClr val="phClr">
-                <a:lumMod val="110000"/>
-                <a:satMod val="105000"/>
-                <a:tint val="67000"/>
+                <a:tint val="65000"/>
+                <a:shade val="92000"/>
+                <a:satMod val="130000"/>
               </a:schemeClr>
             </a:gs>
-            <a:gs pos="50000">
+            <a:gs pos="45000">
               <a:schemeClr val="phClr">
-                <a:lumMod val="105000"/>
-                <a:satMod val="103000"/>
-                <a:tint val="73000"/>
+                <a:tint val="60000"/>
+                <a:shade val="99000"/>
+                <a:satMod val="120000"/>
               </a:schemeClr>
             </a:gs>
             <a:gs pos="100000">
               <a:schemeClr val="phClr">
-                <a:lumMod val="105000"/>
-                <a:satMod val="109000"/>
-                <a:tint val="81000"/>
+                <a:tint val="55000"/>
+                <a:satMod val="140000"/>
               </a:schemeClr>
             </a:gs>
           </a:gsLst>
-          <a:lin ang="5400000" scaled="0"/>
+          <a:path path="circle">
+            <a:fillToRect l="100000" t="100000" r="100000" b="100000"/>
+          </a:path>
         </a:gradFill>
         <a:gradFill rotWithShape="1">
           <a:gsLst>
             <a:gs pos="0">
               <a:schemeClr val="phClr">
-                <a:satMod val="103000"/>
-                <a:lumMod val="102000"/>
-                <a:tint val="94000"/>
+                <a:shade val="85000"/>
+                <a:satMod val="130000"/>
               </a:schemeClr>
             </a:gs>
-            <a:gs pos="50000">
+            <a:gs pos="34000">
               <a:schemeClr val="phClr">
-                <a:satMod val="110000"/>
-                <a:lumMod val="100000"/>
-                <a:shade val="100000"/>
+                <a:shade val="87000"/>
+                <a:satMod val="125000"/>
+              </a:schemeClr>
+            </a:gs>
+            <a:gs pos="70000">
+              <a:schemeClr val="phClr">
+                <a:tint val="100000"/>
+                <a:shade val="90000"/>
+                <a:satMod val="130000"/>
               </a:schemeClr>
             </a:gs>
             <a:gs pos="100000">
               <a:schemeClr val="phClr">
-                <a:lumMod val="99000"/>
-                <a:satMod val="120000"/>
-                <a:shade val="78000"/>
+                <a:tint val="100000"/>
+                <a:shade val="100000"/>
+                <a:satMod val="110000"/>
               </a:schemeClr>
             </a:gs>
           </a:gsLst>
-          <a:lin ang="5400000" scaled="0"/>
+          <a:path path="circle">
+            <a:fillToRect l="100000" t="100000" r="100000" b="100000"/>
+          </a:path>
         </a:gradFill>
       </a:fillStyleLst>
       <a:lnStyleLst>
-        <a:ln w="6350" cap="flat" cmpd="sng" algn="ctr">
-          <a:solidFill>
-            <a:schemeClr val="phClr"/>
-          </a:solidFill>
-          <a:prstDash val="solid"/>
-          <a:miter lim="800000"/>
-        </a:ln>
         <a:ln w="12700" cap="flat" cmpd="sng" algn="ctr">
           <a:solidFill>
             <a:schemeClr val="phClr"/>
           </a:solidFill>
           <a:prstDash val="solid"/>
-          <a:miter lim="800000"/>
         </a:ln>
-        <a:ln w="19050" cap="flat" cmpd="sng" algn="ctr">
+        <a:ln w="15875" cap="flat" cmpd="sng" algn="ctr">
           <a:solidFill>
             <a:schemeClr val="phClr"/>
           </a:solidFill>
           <a:prstDash val="solid"/>
-          <a:miter lim="800000"/>
+        </a:ln>
+        <a:ln w="25400" cap="flat" cmpd="sng" algn="ctr">
+          <a:solidFill>
+            <a:schemeClr val="phClr"/>
+          </a:solidFill>
+          <a:prstDash val="solid"/>
         </a:ln>
       </a:lnStyleLst>
       <a:effectStyleLst>
@@ -3626,16 +3968,33 @@
           <a:effectLst/>
         </a:effectStyle>
         <a:effectStyle>
-          <a:effectLst/>
+          <a:effectLst>
+            <a:outerShdw blurRad="38100" dist="25400" dir="2700000" algn="br" rotWithShape="0">
+              <a:srgbClr val="000000">
+                <a:alpha val="60000"/>
+              </a:srgbClr>
+            </a:outerShdw>
+          </a:effectLst>
         </a:effectStyle>
         <a:effectStyle>
           <a:effectLst>
-            <a:outerShdw blurRad="57150" dist="19050" dir="5400000" algn="ctr" rotWithShape="0">
+            <a:outerShdw blurRad="44450" dist="25400" dir="2700000" algn="br" rotWithShape="0">
               <a:srgbClr val="000000">
-                <a:alpha val="63000"/>
+                <a:alpha val="60000"/>
               </a:srgbClr>
             </a:outerShdw>
           </a:effectLst>
+          <a:scene3d>
+            <a:camera prst="orthographicFront">
+              <a:rot lat="0" lon="0" rev="0"/>
+            </a:camera>
+            <a:lightRig rig="threePt" dir="t">
+              <a:rot lat="0" lon="0" rev="19800000"/>
+            </a:lightRig>
+          </a:scene3d>
+          <a:sp3d prstMaterial="flat">
+            <a:bevelT w="25400" h="31750"/>
+          </a:sp3d>
         </a:effectStyle>
       </a:effectStyleLst>
       <a:bgFillStyleLst>
@@ -3644,36 +4003,36 @@
         </a:solidFill>
         <a:solidFill>
           <a:schemeClr val="phClr">
-            <a:tint val="95000"/>
-            <a:satMod val="170000"/>
+            <a:tint val="90000"/>
+            <a:shade val="97000"/>
+            <a:satMod val="130000"/>
           </a:schemeClr>
         </a:solidFill>
         <a:gradFill rotWithShape="1">
           <a:gsLst>
             <a:gs pos="0">
               <a:schemeClr val="phClr">
-                <a:tint val="93000"/>
-                <a:satMod val="150000"/>
-                <a:shade val="98000"/>
-                <a:lumMod val="102000"/>
+                <a:tint val="96000"/>
+                <a:shade val="99000"/>
+                <a:satMod val="140000"/>
               </a:schemeClr>
             </a:gs>
-            <a:gs pos="50000">
+            <a:gs pos="65000">
               <a:schemeClr val="phClr">
-                <a:tint val="98000"/>
+                <a:tint val="100000"/>
+                <a:shade val="80000"/>
                 <a:satMod val="130000"/>
-                <a:shade val="90000"/>
-                <a:lumMod val="103000"/>
               </a:schemeClr>
             </a:gs>
             <a:gs pos="100000">
               <a:schemeClr val="phClr">
-                <a:shade val="63000"/>
+                <a:tint val="100000"/>
+                <a:shade val="48000"/>
                 <a:satMod val="120000"/>
               </a:schemeClr>
             </a:gs>
           </a:gsLst>
-          <a:lin ang="5400000" scaled="0"/>
+          <a:lin ang="16200000" scaled="0"/>
         </a:gradFill>
       </a:bgFillStyleLst>
     </a:fmtScheme>
@@ -3682,7 +4041,7 @@
   <a:extraClrSchemeLst/>
   <a:extLst>
     <a:ext uri="{05A4C25C-085E-4340-85A3-A5531E510DB2}">
-      <thm15:themeFamily xmlns:thm15="http://schemas.microsoft.com/office/thememl/2012/main" name="Office Theme" id="{62F939B6-93AF-4DB8-9C6B-D6C7DFDC589F}" vid="{4A3C46E8-61CC-4603-A589-7422A47A8E4A}"/>
+      <thm15:themeFamily xmlns:thm15="http://schemas.microsoft.com/office/thememl/2012/main" name="Retrospect" id="{5F128B03-DCCA-4EEB-AB3B-CF2899314A46}" vid="{3F1AAB62-24C6-49D2-8E01-B56FAC9A3DCD}"/>
     </a:ext>
   </a:extLst>
 </a:theme>

</xml_diff>

<commit_message>
added more project slides logic
</commit_message>
<xml_diff>
--- a/Templates/Presentation1.pptx
+++ b/Templates/Presentation1.pptx
@@ -343,7 +343,7 @@
           <a:p>
             <a:fld id="{33EF576E-7D2A-427A-9890-14E4055C307B}" type="datetimeFigureOut">
               <a:rPr lang="en-US" smtClean="0"/>
-              <a:t>11/28/2017</a:t>
+              <a:t>1/27/2018</a:t>
             </a:fld>
             <a:endParaRPr lang="en-US"/>
           </a:p>
@@ -551,7 +551,7 @@
           <a:p>
             <a:fld id="{33EF576E-7D2A-427A-9890-14E4055C307B}" type="datetimeFigureOut">
               <a:rPr lang="en-US" smtClean="0"/>
-              <a:t>11/28/2017</a:t>
+              <a:t>1/27/2018</a:t>
             </a:fld>
             <a:endParaRPr lang="en-US"/>
           </a:p>
@@ -807,7 +807,7 @@
           <a:p>
             <a:fld id="{33EF576E-7D2A-427A-9890-14E4055C307B}" type="datetimeFigureOut">
               <a:rPr lang="en-US" smtClean="0"/>
-              <a:t>11/28/2017</a:t>
+              <a:t>1/27/2018</a:t>
             </a:fld>
             <a:endParaRPr lang="en-US"/>
           </a:p>
@@ -981,7 +981,7 @@
           <a:p>
             <a:fld id="{33EF576E-7D2A-427A-9890-14E4055C307B}" type="datetimeFigureOut">
               <a:rPr lang="en-US" smtClean="0"/>
-              <a:t>11/28/2017</a:t>
+              <a:t>1/27/2018</a:t>
             </a:fld>
             <a:endParaRPr lang="en-US"/>
           </a:p>
@@ -1324,7 +1324,7 @@
           <a:p>
             <a:fld id="{33EF576E-7D2A-427A-9890-14E4055C307B}" type="datetimeFigureOut">
               <a:rPr lang="en-US" smtClean="0"/>
-              <a:t>11/28/2017</a:t>
+              <a:t>1/27/2018</a:t>
             </a:fld>
             <a:endParaRPr lang="en-US"/>
           </a:p>
@@ -1599,7 +1599,7 @@
           <a:p>
             <a:fld id="{33EF576E-7D2A-427A-9890-14E4055C307B}" type="datetimeFigureOut">
               <a:rPr lang="en-US" smtClean="0"/>
-              <a:t>11/28/2017</a:t>
+              <a:t>1/27/2018</a:t>
             </a:fld>
             <a:endParaRPr lang="en-US"/>
           </a:p>
@@ -1978,7 +1978,7 @@
           <a:p>
             <a:fld id="{33EF576E-7D2A-427A-9890-14E4055C307B}" type="datetimeFigureOut">
               <a:rPr lang="en-US" smtClean="0"/>
-              <a:t>11/28/2017</a:t>
+              <a:t>1/27/2018</a:t>
             </a:fld>
             <a:endParaRPr lang="en-US"/>
           </a:p>
@@ -2096,7 +2096,7 @@
           <a:p>
             <a:fld id="{33EF576E-7D2A-427A-9890-14E4055C307B}" type="datetimeFigureOut">
               <a:rPr lang="en-US" smtClean="0"/>
-              <a:t>11/28/2017</a:t>
+              <a:t>1/27/2018</a:t>
             </a:fld>
             <a:endParaRPr lang="en-US"/>
           </a:p>
@@ -2472,7 +2472,7 @@
           <a:p>
             <a:fld id="{33EF576E-7D2A-427A-9890-14E4055C307B}" type="datetimeFigureOut">
               <a:rPr lang="en-US" smtClean="0"/>
-              <a:t>11/28/2017</a:t>
+              <a:t>1/27/2018</a:t>
             </a:fld>
             <a:endParaRPr lang="en-US"/>
           </a:p>
@@ -2854,7 +2854,7 @@
           <a:p>
             <a:fld id="{33EF576E-7D2A-427A-9890-14E4055C307B}" type="datetimeFigureOut">
               <a:rPr lang="en-US" smtClean="0"/>
-              <a:t>11/28/2017</a:t>
+              <a:t>1/27/2018</a:t>
             </a:fld>
             <a:endParaRPr lang="en-US"/>
           </a:p>
@@ -3141,7 +3141,7 @@
           <a:p>
             <a:fld id="{33EF576E-7D2A-427A-9890-14E4055C307B}" type="datetimeFigureOut">
               <a:rPr lang="en-US" smtClean="0"/>
-              <a:t>11/28/2017</a:t>
+              <a:t>1/27/2018</a:t>
             </a:fld>
             <a:endParaRPr lang="en-US"/>
           </a:p>
@@ -3687,9 +3687,10 @@
           <a:lstStyle/>
           <a:p>
             <a:r>
-              <a:rPr lang="en-US" dirty="0"/>
-              <a:t>Casting 305</a:t>
-            </a:r>
+              <a:rPr lang="en-US" dirty="0" err="1"/>
+              <a:t>Castingland</a:t>
+            </a:r>
+            <a:endParaRPr lang="en-US" dirty="0"/>
           </a:p>
         </p:txBody>
       </p:sp>

</xml_diff>

<commit_message>
added age range for talent
</commit_message>
<xml_diff>
--- a/Templates/Presentation1.pptx
+++ b/Templates/Presentation1.pptx
@@ -343,7 +343,7 @@
           <a:p>
             <a:fld id="{33EF576E-7D2A-427A-9890-14E4055C307B}" type="datetimeFigureOut">
               <a:rPr lang="en-US" smtClean="0"/>
-              <a:t>1/27/2018</a:t>
+              <a:t>5/1/2018</a:t>
             </a:fld>
             <a:endParaRPr lang="en-US"/>
           </a:p>
@@ -551,7 +551,7 @@
           <a:p>
             <a:fld id="{33EF576E-7D2A-427A-9890-14E4055C307B}" type="datetimeFigureOut">
               <a:rPr lang="en-US" smtClean="0"/>
-              <a:t>1/27/2018</a:t>
+              <a:t>5/1/2018</a:t>
             </a:fld>
             <a:endParaRPr lang="en-US"/>
           </a:p>
@@ -807,7 +807,7 @@
           <a:p>
             <a:fld id="{33EF576E-7D2A-427A-9890-14E4055C307B}" type="datetimeFigureOut">
               <a:rPr lang="en-US" smtClean="0"/>
-              <a:t>1/27/2018</a:t>
+              <a:t>5/1/2018</a:t>
             </a:fld>
             <a:endParaRPr lang="en-US"/>
           </a:p>
@@ -981,7 +981,7 @@
           <a:p>
             <a:fld id="{33EF576E-7D2A-427A-9890-14E4055C307B}" type="datetimeFigureOut">
               <a:rPr lang="en-US" smtClean="0"/>
-              <a:t>1/27/2018</a:t>
+              <a:t>5/1/2018</a:t>
             </a:fld>
             <a:endParaRPr lang="en-US"/>
           </a:p>
@@ -1324,7 +1324,7 @@
           <a:p>
             <a:fld id="{33EF576E-7D2A-427A-9890-14E4055C307B}" type="datetimeFigureOut">
               <a:rPr lang="en-US" smtClean="0"/>
-              <a:t>1/27/2018</a:t>
+              <a:t>5/1/2018</a:t>
             </a:fld>
             <a:endParaRPr lang="en-US"/>
           </a:p>
@@ -1599,7 +1599,7 @@
           <a:p>
             <a:fld id="{33EF576E-7D2A-427A-9890-14E4055C307B}" type="datetimeFigureOut">
               <a:rPr lang="en-US" smtClean="0"/>
-              <a:t>1/27/2018</a:t>
+              <a:t>5/1/2018</a:t>
             </a:fld>
             <a:endParaRPr lang="en-US"/>
           </a:p>
@@ -1978,7 +1978,7 @@
           <a:p>
             <a:fld id="{33EF576E-7D2A-427A-9890-14E4055C307B}" type="datetimeFigureOut">
               <a:rPr lang="en-US" smtClean="0"/>
-              <a:t>1/27/2018</a:t>
+              <a:t>5/1/2018</a:t>
             </a:fld>
             <a:endParaRPr lang="en-US"/>
           </a:p>
@@ -2096,7 +2096,7 @@
           <a:p>
             <a:fld id="{33EF576E-7D2A-427A-9890-14E4055C307B}" type="datetimeFigureOut">
               <a:rPr lang="en-US" smtClean="0"/>
-              <a:t>1/27/2018</a:t>
+              <a:t>5/1/2018</a:t>
             </a:fld>
             <a:endParaRPr lang="en-US"/>
           </a:p>
@@ -2472,7 +2472,7 @@
           <a:p>
             <a:fld id="{33EF576E-7D2A-427A-9890-14E4055C307B}" type="datetimeFigureOut">
               <a:rPr lang="en-US" smtClean="0"/>
-              <a:t>1/27/2018</a:t>
+              <a:t>5/1/2018</a:t>
             </a:fld>
             <a:endParaRPr lang="en-US"/>
           </a:p>
@@ -2854,7 +2854,7 @@
           <a:p>
             <a:fld id="{33EF576E-7D2A-427A-9890-14E4055C307B}" type="datetimeFigureOut">
               <a:rPr lang="en-US" smtClean="0"/>
-              <a:t>1/27/2018</a:t>
+              <a:t>5/1/2018</a:t>
             </a:fld>
             <a:endParaRPr lang="en-US"/>
           </a:p>
@@ -3141,7 +3141,7 @@
           <a:p>
             <a:fld id="{33EF576E-7D2A-427A-9890-14E4055C307B}" type="datetimeFigureOut">
               <a:rPr lang="en-US" smtClean="0"/>
-              <a:t>1/27/2018</a:t>
+              <a:t>5/1/2018</a:t>
             </a:fld>
             <a:endParaRPr lang="en-US"/>
           </a:p>
@@ -3665,63 +3665,42 @@
           <a:chExt cx="0" cy="0"/>
         </a:xfrm>
       </p:grpSpPr>
-      <p:sp>
-        <p:nvSpPr>
-          <p:cNvPr id="2" name="Title 1">
+      <p:pic>
+        <p:nvPicPr>
+          <p:cNvPr id="7" name="Picture 6">
             <a:extLst>
               <a:ext uri="{FF2B5EF4-FFF2-40B4-BE49-F238E27FC236}">
-                <a16:creationId xmlns:a16="http://schemas.microsoft.com/office/drawing/2014/main" id="{6B0B745A-15E9-4A85-99BC-A09D5EDF6C67}"/>
+                <a16:creationId xmlns:a16="http://schemas.microsoft.com/office/drawing/2014/main" id="{7AD53EB7-DC48-449A-8C65-A6D121591E48}"/>
               </a:ext>
             </a:extLst>
           </p:cNvPr>
-          <p:cNvSpPr>
-            <a:spLocks noGrp="1"/>
-          </p:cNvSpPr>
-          <p:nvPr>
-            <p:ph type="ctrTitle"/>
-          </p:nvPr>
-        </p:nvSpPr>
-        <p:spPr/>
-        <p:txBody>
-          <a:bodyPr/>
-          <a:lstStyle/>
-          <a:p>
-            <a:r>
-              <a:rPr lang="en-US" dirty="0" err="1"/>
-              <a:t>Castingland</a:t>
-            </a:r>
-            <a:endParaRPr lang="en-US" dirty="0"/>
-          </a:p>
-        </p:txBody>
-      </p:sp>
-      <p:sp>
-        <p:nvSpPr>
-          <p:cNvPr id="3" name="Subtitle 2">
+          <p:cNvPicPr>
+            <a:picLocks noChangeAspect="1"/>
+          </p:cNvPicPr>
+          <p:nvPr/>
+        </p:nvPicPr>
+        <p:blipFill>
+          <a:blip r:embed="rId2">
             <a:extLst>
-              <a:ext uri="{FF2B5EF4-FFF2-40B4-BE49-F238E27FC236}">
-                <a16:creationId xmlns:a16="http://schemas.microsoft.com/office/drawing/2014/main" id="{F5505CE5-34F6-43B0-A0A3-467974B19048}"/>
+              <a:ext uri="{28A0092B-C50C-407E-A947-70E740481C1C}">
+                <a14:useLocalDpi xmlns:a14="http://schemas.microsoft.com/office/drawing/2010/main" val="0"/>
               </a:ext>
             </a:extLst>
-          </p:cNvPr>
-          <p:cNvSpPr>
-            <a:spLocks noGrp="1"/>
-          </p:cNvSpPr>
-          <p:nvPr>
-            <p:ph type="subTitle" idx="1"/>
-          </p:nvPr>
-        </p:nvSpPr>
-        <p:spPr/>
-        <p:txBody>
-          <a:bodyPr/>
-          <a:lstStyle/>
-          <a:p>
-            <a:r>
-              <a:rPr lang="en-US" dirty="0"/>
-              <a:t>Talent Presentation</a:t>
-            </a:r>
-          </a:p>
-        </p:txBody>
-      </p:sp>
+          </a:blip>
+          <a:stretch>
+            <a:fillRect/>
+          </a:stretch>
+        </p:blipFill>
+        <p:spPr>
+          <a:xfrm>
+            <a:off x="0" y="0"/>
+            <a:ext cx="12192000" cy="6861880"/>
+          </a:xfrm>
+          <a:prstGeom prst="rect">
+            <a:avLst/>
+          </a:prstGeom>
+        </p:spPr>
+      </p:pic>
     </p:spTree>
     <p:extLst>
       <p:ext uri="{BB962C8B-B14F-4D97-AF65-F5344CB8AC3E}">
@@ -3752,6 +3731,42 @@
           <a:chExt cx="0" cy="0"/>
         </a:xfrm>
       </p:grpSpPr>
+      <p:pic>
+        <p:nvPicPr>
+          <p:cNvPr id="3" name="Picture 2">
+            <a:extLst>
+              <a:ext uri="{FF2B5EF4-FFF2-40B4-BE49-F238E27FC236}">
+                <a16:creationId xmlns:a16="http://schemas.microsoft.com/office/drawing/2014/main" id="{3C3299AA-D786-418B-934D-C13541C9A535}"/>
+              </a:ext>
+            </a:extLst>
+          </p:cNvPr>
+          <p:cNvPicPr>
+            <a:picLocks noChangeAspect="1"/>
+          </p:cNvPicPr>
+          <p:nvPr/>
+        </p:nvPicPr>
+        <p:blipFill>
+          <a:blip r:embed="rId2">
+            <a:extLst>
+              <a:ext uri="{28A0092B-C50C-407E-A947-70E740481C1C}">
+                <a14:useLocalDpi xmlns:a14="http://schemas.microsoft.com/office/drawing/2010/main" val="0"/>
+              </a:ext>
+            </a:extLst>
+          </a:blip>
+          <a:stretch>
+            <a:fillRect/>
+          </a:stretch>
+        </p:blipFill>
+        <p:spPr>
+          <a:xfrm>
+            <a:off x="0" y="0"/>
+            <a:ext cx="12192000" cy="6858000"/>
+          </a:xfrm>
+          <a:prstGeom prst="rect">
+            <a:avLst/>
+          </a:prstGeom>
+        </p:spPr>
+      </p:pic>
     </p:spTree>
     <p:extLst>
       <p:ext uri="{BB962C8B-B14F-4D97-AF65-F5344CB8AC3E}">

</xml_diff>